<commit_message>
Add initial project structure and presentation files for AWS slides
</commit_message>
<xml_diff>
--- a/Cloud_Trends_2025.pptx
+++ b/Cloud_Trends_2025.pptx
@@ -5,19 +5,19 @@
     <p:sldMasterId id="2147483650" r:id="rId1"/>
   </p:sldMasterIdLst>
   <p:notesMasterIdLst>
-    <p:notesMasterId r:id="rId12"/>
+    <p:notesMasterId r:id="rId5"/>
   </p:notesMasterIdLst>
   <p:sldIdLst>
     <p:sldId id="267" r:id="rId2"/>
     <p:sldId id="298" r:id="rId3"/>
     <p:sldId id="299" r:id="rId4"/>
-    <p:sldId id="300" r:id="rId5"/>
-    <p:sldId id="301" r:id="rId6"/>
-    <p:sldId id="302" r:id="rId7"/>
-    <p:sldId id="303" r:id="rId8"/>
-    <p:sldId id="304" r:id="rId9"/>
-    <p:sldId id="305" r:id="rId10"/>
-    <p:sldId id="306" r:id="rId11"/>
+    <p:sldId id="300" r:id="rId12"/>
+    <p:sldId id="301" r:id="rId13"/>
+    <p:sldId id="302" r:id="rId14"/>
+    <p:sldId id="303" r:id="rId15"/>
+    <p:sldId id="304" r:id="rId16"/>
+    <p:sldId id="305" r:id="rId17"/>
+    <p:sldId id="306" r:id="rId18"/>
     <p:sldId id="307" r:id="rId19"/>
     <p:sldId id="308" r:id="rId20"/>
   </p:sldIdLst>
@@ -5121,7 +5121,7 @@
                 <a:ea typeface="Calibri"/>
                 <a:cs typeface="Calibri"/>
               </a:rPr>
-              <a:t>Introduction to Python</a:t>
+              <a:t>Slide 1: Introduction to AWS</a:t>
             </a:r>
             <a:endParaRPr lang="en-US" sz="5000" b="1" dirty="0">
               <a:latin typeface="Calibri"/>
@@ -5145,7 +5145,7 @@
 </file>
 
 <file path=ppt/slides/slide10.xml><?xml version="1.0" encoding="utf-8"?>
-<p:sld xmlns:a="http://schemas.openxmlformats.org/drawingml/2006/main" xmlns:r="http://schemas.openxmlformats.org/officeDocument/2006/relationships" xmlns:p="http://schemas.openxmlformats.org/presentationml/2006/main">
+<p:sld xmlns:a="http://schemas.openxmlformats.org/drawingml/2006/main" xmlns:p="http://schemas.openxmlformats.org/presentationml/2006/main" xmlns:r="http://schemas.openxmlformats.org/officeDocument/2006/relationships">
   <p:cSld>
     <p:spTree>
       <p:nvGrpSpPr>
@@ -5153,20 +5153,13 @@
         <p:cNvGrpSpPr/>
         <p:nvPr/>
       </p:nvGrpSpPr>
-      <p:grpSpPr>
-        <a:xfrm>
-          <a:off x="0" y="0"/>
-          <a:ext cx="0" cy="0"/>
-          <a:chOff x="0" y="0"/>
-          <a:chExt cx="0" cy="0"/>
-        </a:xfrm>
-      </p:grpSpPr>
+      <p:grpSpPr/>
       <p:sp>
         <p:nvSpPr>
           <p:cNvPr id="2" name="Title 1">
             <a:extLst>
               <a:ext uri="{FF2B5EF4-FFF2-40B4-BE49-F238E27FC236}">
-                <a16:creationId xmlns:a16="http://schemas.microsoft.com/office/drawing/2014/main" id="{8AF18870-1A65-268F-D244-BA2148248294}"/>
+                <a16:creationId xmlns:a16="http://schemas.microsoft.com/office/drawing/2014/main" id="{8C546A1E-3282-3F02-B1AB-51E7A78F8696}"/>
               </a:ext>
             </a:extLst>
           </p:cNvPr>
@@ -5185,32 +5178,25 @@
             <a:r>
               <a:rPr lang="en-US" sz="3000" b="1" dirty="0">
                 <a:latin typeface="Calibri"/>
-                <a:ea typeface="Calibri"/>
-                <a:cs typeface="Calibri"/>
-              </a:rPr>
-              <a:t>Dictionaries</a:t>
+                <a:ea typeface="+mj-lt"/>
+                <a:cs typeface="+mj-lt"/>
+              </a:rPr>
+              <a:t>Slide 10: AWS Migration</a:t>
             </a:r>
             <a:endParaRPr lang="en-US" sz="3000" b="1" dirty="0">
               <a:latin typeface="Calibri"/>
               <a:ea typeface="Calibri"/>
-              <a:cs typeface="Poppins SemiBold"/>
+              <a:cs typeface="Calibri"/>
             </a:endParaRPr>
           </a:p>
-          <a:p>
-            <a:endParaRPr lang="en-US" sz="3000" b="1" dirty="0">
-              <a:latin typeface="Calibri"/>
-              <a:ea typeface="Calibri"/>
-              <a:cs typeface="Poppins SemiBold"/>
-            </a:endParaRPr>
-          </a:p>
-        </p:txBody>
-      </p:sp>
-      <p:sp>
-        <p:nvSpPr>
-          <p:cNvPr id="4" name="TextBox 3">
+        </p:txBody>
+      </p:sp>
+      <p:sp>
+        <p:nvSpPr>
+          <p:cNvPr id="7" name="TextBox 6">
             <a:extLst>
               <a:ext uri="{FF2B5EF4-FFF2-40B4-BE49-F238E27FC236}">
-                <a16:creationId xmlns:a16="http://schemas.microsoft.com/office/drawing/2014/main" id="{7DA77F78-87E2-A976-6BFC-89FDE60C9467}"/>
+                <a16:creationId xmlns:a16="http://schemas.microsoft.com/office/drawing/2014/main" id="{D76FDF05-21BE-47CA-8E8E-B251B94A77D7}"/>
               </a:ext>
             </a:extLst>
           </p:cNvPr>
@@ -5219,8 +5205,8 @@
         </p:nvSpPr>
         <p:spPr>
           <a:xfrm>
-            <a:off x="1532084" y="1445776"/>
-            <a:ext cx="10127846" cy="547714"/>
+            <a:off x="2622428" y="1305911"/>
+            <a:ext cx="9396662" cy="547714"/>
           </a:xfrm>
           <a:prstGeom prst="rect">
             <a:avLst/>
@@ -5240,53 +5226,287 @@
               <a:lnSpc>
                 <a:spcPct val="150000"/>
               </a:lnSpc>
-              <a:spcAft>
-                <a:spcPts val="600"/>
-              </a:spcAft>
               <a:buFont typeface="Arial" panose="020B0604020202020204" pitchFamily="34" charset="0"/>
               <a:buChar char="•"/>
-              <a:defRPr sz="2200">
-                <a:latin typeface="Calibri"/>
-              </a:defRPr>
             </a:pPr>
             <a:r>
-              <a:t>Unordered collections of key-value pairs</a:t>
-            </a:r>
-          </a:p>
-          <a:p>
-            <a:pPr>
+              <a:rPr sz="2200">
+                <a:solidFill>
+                  <a:srgbClr val="000000"/>
+                </a:solidFill>
+                <a:latin typeface="Calibri"/>
+              </a:rPr>
+              <a:t/>
+            </a:r>
+            <a:r>
+              <a:rPr b="1" sz="2200">
+                <a:solidFill>
+                  <a:srgbClr val="000000"/>
+                </a:solidFill>
+                <a:latin typeface="Calibri"/>
+              </a:rPr>
+              <a:t>Assessment</a:t>
+            </a:r>
+            <a:r>
+              <a:rPr sz="2200">
+                <a:solidFill>
+                  <a:srgbClr val="000000"/>
+                </a:solidFill>
+                <a:latin typeface="Calibri"/>
+              </a:rPr>
+              <a:t>: evaluate </a:t>
+            </a:r>
+            <a:r>
+              <a:rPr b="1" sz="2200">
+                <a:solidFill>
+                  <a:srgbClr val="000000"/>
+                </a:solidFill>
+                <a:latin typeface="Calibri"/>
+              </a:rPr>
+              <a:t>workloads</a:t>
+            </a:r>
+            <a:r>
+              <a:rPr sz="2200">
+                <a:solidFill>
+                  <a:srgbClr val="000000"/>
+                </a:solidFill>
+                <a:latin typeface="Calibri"/>
+              </a:rPr>
+              <a:t> for </a:t>
+            </a:r>
+            <a:r>
+              <a:rPr b="1" sz="2200">
+                <a:solidFill>
+                  <a:srgbClr val="000000"/>
+                </a:solidFill>
+                <a:latin typeface="Calibri"/>
+              </a:rPr>
+              <a:t>migration</a:t>
+            </a:r>
+            <a:r>
+              <a:rPr sz="2200">
+                <a:solidFill>
+                  <a:srgbClr val="000000"/>
+                </a:solidFill>
+                <a:latin typeface="Calibri"/>
+              </a:rPr>
+              <a:t/>
+            </a:r>
+          </a:p>
+          <a:p>
+            <a:pPr algn="l">
               <a:spcAft>
-                <a:spcPts val="600"/>
+                <a:spcPts val="500"/>
               </a:spcAft>
-              <a:defRPr sz="2200">
-                <a:latin typeface="Calibri"/>
-              </a:defRPr>
             </a:pPr>
             <a:r>
-              <a:t>Defined using curly brackets {}</a:t>
-            </a:r>
-          </a:p>
-          <a:p>
-            <a:pPr>
+              <a:rPr sz="2200">
+                <a:solidFill>
+                  <a:srgbClr val="000000"/>
+                </a:solidFill>
+                <a:latin typeface="Calibri"/>
+              </a:rPr>
+              <a:t/>
+            </a:r>
+            <a:r>
+              <a:rPr b="1" sz="2200">
+                <a:solidFill>
+                  <a:srgbClr val="000000"/>
+                </a:solidFill>
+                <a:latin typeface="Calibri"/>
+              </a:rPr>
+              <a:t>Planning</a:t>
+            </a:r>
+            <a:r>
+              <a:rPr sz="2200">
+                <a:solidFill>
+                  <a:srgbClr val="000000"/>
+                </a:solidFill>
+                <a:latin typeface="Calibri"/>
+              </a:rPr>
+              <a:t>: create a </a:t>
+            </a:r>
+            <a:r>
+              <a:rPr b="1" sz="2200">
+                <a:solidFill>
+                  <a:srgbClr val="000000"/>
+                </a:solidFill>
+                <a:latin typeface="Calibri"/>
+              </a:rPr>
+              <a:t>migration</a:t>
+            </a:r>
+            <a:r>
+              <a:rPr sz="2200">
+                <a:solidFill>
+                  <a:srgbClr val="000000"/>
+                </a:solidFill>
+                <a:latin typeface="Calibri"/>
+              </a:rPr>
+              <a:t> plan and </a:t>
+            </a:r>
+            <a:r>
+              <a:rPr b="1" sz="2200">
+                <a:solidFill>
+                  <a:srgbClr val="000000"/>
+                </a:solidFill>
+                <a:latin typeface="Calibri"/>
+              </a:rPr>
+              <a:t>timeline</a:t>
+            </a:r>
+            <a:r>
+              <a:rPr sz="2200">
+                <a:solidFill>
+                  <a:srgbClr val="000000"/>
+                </a:solidFill>
+                <a:latin typeface="Calibri"/>
+              </a:rPr>
+              <a:t/>
+            </a:r>
+          </a:p>
+          <a:p>
+            <a:pPr algn="l">
               <a:spcAft>
-                <a:spcPts val="600"/>
+                <a:spcPts val="500"/>
               </a:spcAft>
-              <a:defRPr sz="2200">
-                <a:latin typeface="Calibri"/>
-              </a:defRPr>
             </a:pPr>
             <a:r>
-              <a:t>Support lookup and modification</a:t>
-            </a:r>
+              <a:rPr sz="2200">
+                <a:solidFill>
+                  <a:srgbClr val="000000"/>
+                </a:solidFill>
+                <a:latin typeface="Calibri"/>
+              </a:rPr>
+              <a:t/>
+            </a:r>
+            <a:r>
+              <a:rPr b="1" sz="2200">
+                <a:solidFill>
+                  <a:srgbClr val="000000"/>
+                </a:solidFill>
+                <a:latin typeface="Calibri"/>
+              </a:rPr>
+              <a:t>Execution</a:t>
+            </a:r>
+            <a:r>
+              <a:rPr sz="2200">
+                <a:solidFill>
+                  <a:srgbClr val="000000"/>
+                </a:solidFill>
+                <a:latin typeface="Calibri"/>
+              </a:rPr>
+              <a:t>: perform the </a:t>
+            </a:r>
+            <a:r>
+              <a:rPr b="1" sz="2200">
+                <a:solidFill>
+                  <a:srgbClr val="000000"/>
+                </a:solidFill>
+                <a:latin typeface="Calibri"/>
+              </a:rPr>
+              <a:t>migration</a:t>
+            </a:r>
+            <a:r>
+              <a:rPr sz="2200">
+                <a:solidFill>
+                  <a:srgbClr val="000000"/>
+                </a:solidFill>
+                <a:latin typeface="Calibri"/>
+              </a:rPr>
+              <a:t> and </a:t>
+            </a:r>
+            <a:r>
+              <a:rPr b="1" sz="2200">
+                <a:solidFill>
+                  <a:srgbClr val="000000"/>
+                </a:solidFill>
+                <a:latin typeface="Calibri"/>
+              </a:rPr>
+              <a:t>validate</a:t>
+            </a:r>
+            <a:r>
+              <a:rPr sz="2200">
+                <a:solidFill>
+                  <a:srgbClr val="000000"/>
+                </a:solidFill>
+                <a:latin typeface="Calibri"/>
+              </a:rPr>
+              <a:t> results</a:t>
+            </a:r>
+          </a:p>
+        </p:txBody>
+      </p:sp>
+      <p:sp>
+        <p:nvSpPr>
+          <p:cNvPr id="4" name="TextBox 3">
+            <a:extLst>
+              <a:ext uri="{FF2B5EF4-FFF2-40B4-BE49-F238E27FC236}">
+                <a16:creationId xmlns:a16="http://schemas.microsoft.com/office/drawing/2014/main" id="{31D49A63-113D-4D89-FCDF-641BB513C668}"/>
+              </a:ext>
+            </a:extLst>
+          </p:cNvPr>
+          <p:cNvSpPr txBox="1"/>
+          <p:nvPr/>
+        </p:nvSpPr>
+        <p:spPr>
+          <a:xfrm>
+            <a:off x="1637862" y="4114798"/>
+            <a:ext cx="4853165" cy="369332"/>
+          </a:xfrm>
+          <a:prstGeom prst="rect">
+            <a:avLst/>
+          </a:prstGeom>
+          <a:noFill/>
+        </p:spPr>
+        <p:txBody>
+          <a:bodyPr wrap="square" rtlCol="0" anchor="t" anchorCtr="0">
+            <a:spAutoFit/>
+          </a:bodyPr>
+          <a:lstStyle/>
+          <a:p>
+            <a:r>
+              <a:rPr lang="en-IN" dirty="0"/>
+              <a:t/>
+            </a:r>
+          </a:p>
+        </p:txBody>
+      </p:sp>
+      <p:sp>
+        <p:nvSpPr>
+          <p:cNvPr id="5" name="TextBox 4">
+            <a:extLst>
+              <a:ext uri="{FF2B5EF4-FFF2-40B4-BE49-F238E27FC236}">
+                <a16:creationId xmlns:a16="http://schemas.microsoft.com/office/drawing/2014/main" id="{5DDDEAD6-0A16-A764-2C88-3B42006212FC}"/>
+              </a:ext>
+            </a:extLst>
+          </p:cNvPr>
+          <p:cNvSpPr txBox="1"/>
+          <p:nvPr/>
+        </p:nvSpPr>
+        <p:spPr>
+          <a:xfrm>
+            <a:off x="6491027" y="4114797"/>
+            <a:ext cx="6444000" cy="3348000"/>
+          </a:xfrm>
+          <a:prstGeom prst="rect">
+            <a:avLst/>
+          </a:prstGeom>
+          <a:noFill/>
+        </p:spPr>
+        <p:txBody>
+          <a:bodyPr wrap="square" rtlCol="0" anchor="t" anchorCtr="0">
+            <a:spAutoFit/>
+          </a:bodyPr>
+          <a:lstStyle/>
+          <a:p>
+            <a:r>
+              <a:rPr lang="en-IN"/>
+              <a:t>status code: 404 -&gt; https://example.com/aws-migration.png</a:t>
+            </a:r>
+            <a:endParaRPr lang="en-IN" dirty="0"/>
           </a:p>
         </p:txBody>
       </p:sp>
     </p:spTree>
-    <p:extLst>
-      <p:ext uri="{BB962C8B-B14F-4D97-AF65-F5344CB8AC3E}">
-        <p14:creationId xmlns:p14="http://schemas.microsoft.com/office/powerpoint/2010/main" val="2656688189"/>
-      </p:ext>
-    </p:extLst>
   </p:cSld>
   <p:clrMapOvr>
     <a:masterClrMapping/>
@@ -5309,7 +5529,7 @@
           <p:cNvPr id="2" name="Title 1">
             <a:extLst>
               <a:ext uri="{FF2B5EF4-FFF2-40B4-BE49-F238E27FC236}">
-                <a16:creationId xmlns:a16="http://schemas.microsoft.com/office/drawing/2014/main" id="{8AF18870-1A65-268F-D244-BA2148248294}"/>
+                <a16:creationId xmlns:a16="http://schemas.microsoft.com/office/drawing/2014/main" id="{8C546A1E-3282-3F02-B1AB-51E7A78F8696}"/>
               </a:ext>
             </a:extLst>
           </p:cNvPr>
@@ -5328,32 +5548,25 @@
             <a:r>
               <a:rPr lang="en-US" sz="3000" b="1" dirty="0">
                 <a:latin typeface="Calibri"/>
-                <a:ea typeface="Calibri"/>
-                <a:cs typeface="Calibri"/>
-              </a:rPr>
-              <a:t>Best Practices</a:t>
+                <a:ea typeface="+mj-lt"/>
+                <a:cs typeface="+mj-lt"/>
+              </a:rPr>
+              <a:t>Slide 11: AWS Best Practices</a:t>
             </a:r>
             <a:endParaRPr lang="en-US" sz="3000" b="1" dirty="0">
               <a:latin typeface="Calibri"/>
               <a:ea typeface="Calibri"/>
-              <a:cs typeface="Poppins SemiBold"/>
+              <a:cs typeface="Calibri"/>
             </a:endParaRPr>
           </a:p>
-          <a:p>
-            <a:endParaRPr lang="en-US" sz="3000" b="1" dirty="0">
-              <a:latin typeface="Calibri"/>
-              <a:ea typeface="Calibri"/>
-              <a:cs typeface="Poppins SemiBold"/>
-            </a:endParaRPr>
-          </a:p>
-        </p:txBody>
-      </p:sp>
-      <p:sp>
-        <p:nvSpPr>
-          <p:cNvPr id="4" name="TextBox 3">
+        </p:txBody>
+      </p:sp>
+      <p:sp>
+        <p:nvSpPr>
+          <p:cNvPr id="7" name="TextBox 6">
             <a:extLst>
               <a:ext uri="{FF2B5EF4-FFF2-40B4-BE49-F238E27FC236}">
-                <a16:creationId xmlns:a16="http://schemas.microsoft.com/office/drawing/2014/main" id="{7DA77F78-87E2-A976-6BFC-89FDE60C9467}"/>
+                <a16:creationId xmlns:a16="http://schemas.microsoft.com/office/drawing/2014/main" id="{D76FDF05-21BE-47CA-8E8E-B251B94A77D7}"/>
               </a:ext>
             </a:extLst>
           </p:cNvPr>
@@ -5362,8 +5575,8 @@
         </p:nvSpPr>
         <p:spPr>
           <a:xfrm>
-            <a:off x="1532084" y="1445776"/>
-            <a:ext cx="10127846" cy="547714"/>
+            <a:off x="2622428" y="1305911"/>
+            <a:ext cx="9396662" cy="547714"/>
           </a:xfrm>
           <a:prstGeom prst="rect">
             <a:avLst/>
@@ -5383,44 +5596,283 @@
               <a:lnSpc>
                 <a:spcPct val="150000"/>
               </a:lnSpc>
-              <a:spcAft>
-                <a:spcPts val="600"/>
-              </a:spcAft>
               <a:buFont typeface="Arial" panose="020B0604020202020204" pitchFamily="34" charset="0"/>
               <a:buChar char="•"/>
-              <a:defRPr sz="2200">
-                <a:latin typeface="Calibri"/>
-              </a:defRPr>
             </a:pPr>
             <a:r>
-              <a:t>Use meaningful variable names</a:t>
-            </a:r>
-          </a:p>
-          <a:p>
-            <a:pPr>
+              <a:rPr sz="2200">
+                <a:solidFill>
+                  <a:srgbClr val="000000"/>
+                </a:solidFill>
+                <a:latin typeface="Calibri"/>
+              </a:rPr>
+              <a:t/>
+            </a:r>
+            <a:r>
+              <a:rPr b="1" sz="2200">
+                <a:solidFill>
+                  <a:srgbClr val="000000"/>
+                </a:solidFill>
+                <a:latin typeface="Calibri"/>
+              </a:rPr>
+              <a:t>Design for </a:t>
+            </a:r>
+            <a:r>
+              <a:rPr sz="2200">
+                <a:solidFill>
+                  <a:srgbClr val="000000"/>
+                </a:solidFill>
+                <a:latin typeface="Calibri"/>
+              </a:rPr>
+              <a:t>failures</a:t>
+            </a:r>
+            <a:r>
+              <a:rPr b="1" sz="2200">
+                <a:solidFill>
+                  <a:srgbClr val="000000"/>
+                </a:solidFill>
+                <a:latin typeface="Calibri"/>
+              </a:rPr>
+              <a:t> and </a:t>
+            </a:r>
+            <a:r>
+              <a:rPr sz="2200">
+                <a:solidFill>
+                  <a:srgbClr val="000000"/>
+                </a:solidFill>
+                <a:latin typeface="Calibri"/>
+              </a:rPr>
+              <a:t>downtime</a:t>
+            </a:r>
+            <a:r>
+              <a:rPr b="1" sz="2200">
+                <a:solidFill>
+                  <a:srgbClr val="000000"/>
+                </a:solidFill>
+                <a:latin typeface="Calibri"/>
+              </a:rPr>
+              <a:t/>
+            </a:r>
+            <a:r>
+              <a:rPr sz="2200">
+                <a:solidFill>
+                  <a:srgbClr val="000000"/>
+                </a:solidFill>
+                <a:latin typeface="Calibri"/>
+              </a:rPr>
+              <a:t/>
+            </a:r>
+          </a:p>
+          <a:p>
+            <a:pPr algn="l">
               <a:spcAft>
-                <a:spcPts val="600"/>
+                <a:spcPts val="500"/>
               </a:spcAft>
-              <a:defRPr sz="2200">
-                <a:latin typeface="Calibri"/>
-              </a:defRPr>
             </a:pPr>
             <a:r>
-              <a:t>Follow PEP 8 style guide</a:t>
-            </a:r>
-          </a:p>
-          <a:p>
-            <a:pPr>
+              <a:rPr sz="2200">
+                <a:solidFill>
+                  <a:srgbClr val="000000"/>
+                </a:solidFill>
+                <a:latin typeface="Calibri"/>
+              </a:rPr>
+              <a:t/>
+            </a:r>
+            <a:r>
+              <a:rPr b="1" sz="2200">
+                <a:solidFill>
+                  <a:srgbClr val="000000"/>
+                </a:solidFill>
+                <a:latin typeface="Calibri"/>
+              </a:rPr>
+              <a:t>Monitor</a:t>
+            </a:r>
+            <a:r>
+              <a:rPr sz="2200">
+                <a:solidFill>
+                  <a:srgbClr val="000000"/>
+                </a:solidFill>
+                <a:latin typeface="Calibri"/>
+              </a:rPr>
+              <a:t> and </a:t>
+            </a:r>
+            <a:r>
+              <a:rPr b="1" sz="2200">
+                <a:solidFill>
+                  <a:srgbClr val="000000"/>
+                </a:solidFill>
+                <a:latin typeface="Calibri"/>
+              </a:rPr>
+              <a:t>optimize</a:t>
+            </a:r>
+            <a:r>
+              <a:rPr sz="2200">
+                <a:solidFill>
+                  <a:srgbClr val="000000"/>
+                </a:solidFill>
+                <a:latin typeface="Calibri"/>
+              </a:rPr>
+              <a:t> </a:t>
+            </a:r>
+            <a:r>
+              <a:rPr b="1" sz="2200">
+                <a:solidFill>
+                  <a:srgbClr val="000000"/>
+                </a:solidFill>
+                <a:latin typeface="Calibri"/>
+              </a:rPr>
+              <a:t>performance</a:t>
+            </a:r>
+            <a:r>
+              <a:rPr sz="2200">
+                <a:solidFill>
+                  <a:srgbClr val="000000"/>
+                </a:solidFill>
+                <a:latin typeface="Calibri"/>
+              </a:rPr>
+              <a:t/>
+            </a:r>
+          </a:p>
+          <a:p>
+            <a:pPr algn="l">
               <a:spcAft>
-                <a:spcPts val="600"/>
+                <a:spcPts val="500"/>
               </a:spcAft>
-              <a:defRPr sz="2200">
-                <a:latin typeface="Calibri"/>
-              </a:defRPr>
             </a:pPr>
             <a:r>
-              <a:t>Test and debug your code regularly</a:t>
-            </a:r>
+              <a:rPr sz="2200">
+                <a:solidFill>
+                  <a:srgbClr val="000000"/>
+                </a:solidFill>
+                <a:latin typeface="Calibri"/>
+              </a:rPr>
+              <a:t/>
+            </a:r>
+            <a:r>
+              <a:rPr b="1" sz="2200">
+                <a:solidFill>
+                  <a:srgbClr val="000000"/>
+                </a:solidFill>
+                <a:latin typeface="Calibri"/>
+              </a:rPr>
+              <a:t>Implement </a:t>
+            </a:r>
+            <a:r>
+              <a:rPr sz="2200">
+                <a:solidFill>
+                  <a:srgbClr val="000000"/>
+                </a:solidFill>
+                <a:latin typeface="Calibri"/>
+              </a:rPr>
+              <a:t>security</a:t>
+            </a:r>
+            <a:r>
+              <a:rPr b="1" sz="2200">
+                <a:solidFill>
+                  <a:srgbClr val="000000"/>
+                </a:solidFill>
+                <a:latin typeface="Calibri"/>
+              </a:rPr>
+              <a:t> and </a:t>
+            </a:r>
+            <a:r>
+              <a:rPr sz="2200">
+                <a:solidFill>
+                  <a:srgbClr val="000000"/>
+                </a:solidFill>
+                <a:latin typeface="Calibri"/>
+              </a:rPr>
+              <a:t>compliance</a:t>
+            </a:r>
+            <a:r>
+              <a:rPr b="1" sz="2200">
+                <a:solidFill>
+                  <a:srgbClr val="000000"/>
+                </a:solidFill>
+                <a:latin typeface="Calibri"/>
+              </a:rPr>
+              <a:t/>
+            </a:r>
+            <a:r>
+              <a:rPr sz="2200">
+                <a:solidFill>
+                  <a:srgbClr val="000000"/>
+                </a:solidFill>
+                <a:latin typeface="Calibri"/>
+              </a:rPr>
+              <a:t> measures</a:t>
+            </a:r>
+          </a:p>
+        </p:txBody>
+      </p:sp>
+      <p:sp>
+        <p:nvSpPr>
+          <p:cNvPr id="4" name="TextBox 3">
+            <a:extLst>
+              <a:ext uri="{FF2B5EF4-FFF2-40B4-BE49-F238E27FC236}">
+                <a16:creationId xmlns:a16="http://schemas.microsoft.com/office/drawing/2014/main" id="{31D49A63-113D-4D89-FCDF-641BB513C668}"/>
+              </a:ext>
+            </a:extLst>
+          </p:cNvPr>
+          <p:cNvSpPr txBox="1"/>
+          <p:nvPr/>
+        </p:nvSpPr>
+        <p:spPr>
+          <a:xfrm>
+            <a:off x="1637862" y="4114798"/>
+            <a:ext cx="4853165" cy="369332"/>
+          </a:xfrm>
+          <a:prstGeom prst="rect">
+            <a:avLst/>
+          </a:prstGeom>
+          <a:noFill/>
+        </p:spPr>
+        <p:txBody>
+          <a:bodyPr wrap="square" rtlCol="0" anchor="t" anchorCtr="0">
+            <a:spAutoFit/>
+          </a:bodyPr>
+          <a:lstStyle/>
+          <a:p>
+            <a:r>
+              <a:rPr lang="en-IN" dirty="0"/>
+              <a:t/>
+            </a:r>
+          </a:p>
+        </p:txBody>
+      </p:sp>
+      <p:sp>
+        <p:nvSpPr>
+          <p:cNvPr id="5" name="TextBox 4">
+            <a:extLst>
+              <a:ext uri="{FF2B5EF4-FFF2-40B4-BE49-F238E27FC236}">
+                <a16:creationId xmlns:a16="http://schemas.microsoft.com/office/drawing/2014/main" id="{5DDDEAD6-0A16-A764-2C88-3B42006212FC}"/>
+              </a:ext>
+            </a:extLst>
+          </p:cNvPr>
+          <p:cNvSpPr txBox="1"/>
+          <p:nvPr/>
+        </p:nvSpPr>
+        <p:spPr>
+          <a:xfrm>
+            <a:off x="6491027" y="4114797"/>
+            <a:ext cx="6444000" cy="3348000"/>
+          </a:xfrm>
+          <a:prstGeom prst="rect">
+            <a:avLst/>
+          </a:prstGeom>
+          <a:noFill/>
+        </p:spPr>
+        <p:txBody>
+          <a:bodyPr wrap="square" rtlCol="0" anchor="t" anchorCtr="0">
+            <a:spAutoFit/>
+          </a:bodyPr>
+          <a:lstStyle/>
+          <a:p>
+            <a:r>
+              <a:rPr lang="en-IN"/>
+              <a:t>status code: 404 -&gt; https://example.com/aws-best-practices.png</a:t>
+            </a:r>
+            <a:endParaRPr lang="en-IN" dirty="0"/>
           </a:p>
         </p:txBody>
       </p:sp>
@@ -5447,7 +5899,7 @@
           <p:cNvPr id="2" name="Title 1">
             <a:extLst>
               <a:ext uri="{FF2B5EF4-FFF2-40B4-BE49-F238E27FC236}">
-                <a16:creationId xmlns:a16="http://schemas.microsoft.com/office/drawing/2014/main" id="{8AF18870-1A65-268F-D244-BA2148248294}"/>
+                <a16:creationId xmlns:a16="http://schemas.microsoft.com/office/drawing/2014/main" id="{8C546A1E-3282-3F02-B1AB-51E7A78F8696}"/>
               </a:ext>
             </a:extLst>
           </p:cNvPr>
@@ -5466,32 +5918,25 @@
             <a:r>
               <a:rPr lang="en-US" sz="3000" b="1" dirty="0">
                 <a:latin typeface="Calibri"/>
-                <a:ea typeface="Calibri"/>
-                <a:cs typeface="Calibri"/>
-              </a:rPr>
-              <a:t>Conclusion</a:t>
+                <a:ea typeface="+mj-lt"/>
+                <a:cs typeface="+mj-lt"/>
+              </a:rPr>
+              <a:t>Slide 12: Conclusion</a:t>
             </a:r>
             <a:endParaRPr lang="en-US" sz="3000" b="1" dirty="0">
               <a:latin typeface="Calibri"/>
               <a:ea typeface="Calibri"/>
-              <a:cs typeface="Poppins SemiBold"/>
+              <a:cs typeface="Calibri"/>
             </a:endParaRPr>
           </a:p>
-          <a:p>
-            <a:endParaRPr lang="en-US" sz="3000" b="1" dirty="0">
-              <a:latin typeface="Calibri"/>
-              <a:ea typeface="Calibri"/>
-              <a:cs typeface="Poppins SemiBold"/>
-            </a:endParaRPr>
-          </a:p>
-        </p:txBody>
-      </p:sp>
-      <p:sp>
-        <p:nvSpPr>
-          <p:cNvPr id="4" name="TextBox 3">
+        </p:txBody>
+      </p:sp>
+      <p:sp>
+        <p:nvSpPr>
+          <p:cNvPr id="7" name="TextBox 6">
             <a:extLst>
               <a:ext uri="{FF2B5EF4-FFF2-40B4-BE49-F238E27FC236}">
-                <a16:creationId xmlns:a16="http://schemas.microsoft.com/office/drawing/2014/main" id="{7DA77F78-87E2-A976-6BFC-89FDE60C9467}"/>
+                <a16:creationId xmlns:a16="http://schemas.microsoft.com/office/drawing/2014/main" id="{D76FDF05-21BE-47CA-8E8E-B251B94A77D7}"/>
               </a:ext>
             </a:extLst>
           </p:cNvPr>
@@ -5500,8 +5945,8 @@
         </p:nvSpPr>
         <p:spPr>
           <a:xfrm>
-            <a:off x="1532084" y="1445776"/>
-            <a:ext cx="10127846" cy="547714"/>
+            <a:off x="2622428" y="1305911"/>
+            <a:ext cx="9396662" cy="547714"/>
           </a:xfrm>
           <a:prstGeom prst="rect">
             <a:avLst/>
@@ -5521,44 +5966,265 @@
               <a:lnSpc>
                 <a:spcPct val="150000"/>
               </a:lnSpc>
-              <a:spcAft>
-                <a:spcPts val="600"/>
-              </a:spcAft>
               <a:buFont typeface="Arial" panose="020B0604020202020204" pitchFamily="34" charset="0"/>
               <a:buChar char="•"/>
-              <a:defRPr sz="2200">
-                <a:latin typeface="Calibri"/>
-              </a:defRPr>
             </a:pPr>
             <a:r>
-              <a:t>Python is a versatile and widely-used language</a:t>
-            </a:r>
-          </a:p>
-          <a:p>
-            <a:pPr>
+              <a:rPr sz="2200">
+                <a:solidFill>
+                  <a:srgbClr val="000000"/>
+                </a:solidFill>
+                <a:latin typeface="Calibri"/>
+              </a:rPr>
+              <a:t>AWS is a powerful </a:t>
+            </a:r>
+            <a:r>
+              <a:rPr b="1" sz="2200">
+                <a:solidFill>
+                  <a:srgbClr val="000000"/>
+                </a:solidFill>
+                <a:latin typeface="Calibri"/>
+              </a:rPr>
+              <a:t>cloud computing</a:t>
+            </a:r>
+            <a:r>
+              <a:rPr sz="2200">
+                <a:solidFill>
+                  <a:srgbClr val="000000"/>
+                </a:solidFill>
+                <a:latin typeface="Calibri"/>
+              </a:rPr>
+              <a:t> platform</a:t>
+            </a:r>
+          </a:p>
+          <a:p>
+            <a:pPr algn="l">
               <a:spcAft>
-                <a:spcPts val="600"/>
+                <a:spcPts val="500"/>
               </a:spcAft>
-              <a:defRPr sz="2200">
-                <a:latin typeface="Calibri"/>
-              </a:defRPr>
             </a:pPr>
             <a:r>
-              <a:t>Continuously learn and practice to improve skills</a:t>
-            </a:r>
-          </a:p>
-          <a:p>
-            <a:pPr>
+              <a:rPr sz="2200">
+                <a:solidFill>
+                  <a:srgbClr val="000000"/>
+                </a:solidFill>
+                <a:latin typeface="Calibri"/>
+              </a:rPr>
+              <a:t>Offers a wide range of </a:t>
+            </a:r>
+            <a:r>
+              <a:rPr b="1" sz="2200">
+                <a:solidFill>
+                  <a:srgbClr val="000000"/>
+                </a:solidFill>
+                <a:latin typeface="Calibri"/>
+              </a:rPr>
+              <a:t>services</a:t>
+            </a:r>
+            <a:r>
+              <a:rPr sz="2200">
+                <a:solidFill>
+                  <a:srgbClr val="000000"/>
+                </a:solidFill>
+                <a:latin typeface="Calibri"/>
+              </a:rPr>
+              <a:t> and </a:t>
+            </a:r>
+            <a:r>
+              <a:rPr b="1" sz="2200">
+                <a:solidFill>
+                  <a:srgbClr val="000000"/>
+                </a:solidFill>
+                <a:latin typeface="Calibri"/>
+              </a:rPr>
+              <a:t>tools</a:t>
+            </a:r>
+            <a:r>
+              <a:rPr sz="2200">
+                <a:solidFill>
+                  <a:srgbClr val="000000"/>
+                </a:solidFill>
+                <a:latin typeface="Calibri"/>
+              </a:rPr>
+              <a:t> for </a:t>
+            </a:r>
+            <a:r>
+              <a:rPr b="1" sz="2200">
+                <a:solidFill>
+                  <a:srgbClr val="000000"/>
+                </a:solidFill>
+                <a:latin typeface="Calibri"/>
+              </a:rPr>
+              <a:t>scalability</a:t>
+            </a:r>
+            <a:r>
+              <a:rPr sz="2200">
+                <a:solidFill>
+                  <a:srgbClr val="000000"/>
+                </a:solidFill>
+                <a:latin typeface="Calibri"/>
+              </a:rPr>
+              <a:t> and </a:t>
+            </a:r>
+            <a:r>
+              <a:rPr b="1" sz="2200">
+                <a:solidFill>
+                  <a:srgbClr val="000000"/>
+                </a:solidFill>
+                <a:latin typeface="Calibri"/>
+              </a:rPr>
+              <a:t>reliability</a:t>
+            </a:r>
+            <a:r>
+              <a:rPr sz="2200">
+                <a:solidFill>
+                  <a:srgbClr val="000000"/>
+                </a:solidFill>
+                <a:latin typeface="Calibri"/>
+              </a:rPr>
+              <a:t/>
+            </a:r>
+          </a:p>
+          <a:p>
+            <a:pPr algn="l">
               <a:spcAft>
-                <a:spcPts val="600"/>
+                <a:spcPts val="500"/>
               </a:spcAft>
-              <a:defRPr sz="2200">
-                <a:latin typeface="Calibri"/>
-              </a:defRPr>
             </a:pPr>
             <a:r>
-              <a:t>Join online communities for support and resources</a:t>
-            </a:r>
+              <a:rPr sz="2200">
+                <a:solidFill>
+                  <a:srgbClr val="000000"/>
+                </a:solidFill>
+                <a:latin typeface="Calibri"/>
+              </a:rPr>
+              <a:t>Follow </a:t>
+            </a:r>
+            <a:r>
+              <a:rPr b="1" sz="2200">
+                <a:solidFill>
+                  <a:srgbClr val="000000"/>
+                </a:solidFill>
+                <a:latin typeface="Calibri"/>
+              </a:rPr>
+              <a:t>best practices</a:t>
+            </a:r>
+            <a:r>
+              <a:rPr sz="2200">
+                <a:solidFill>
+                  <a:srgbClr val="000000"/>
+                </a:solidFill>
+                <a:latin typeface="Calibri"/>
+              </a:rPr>
+              <a:t> and </a:t>
+            </a:r>
+            <a:r>
+              <a:rPr b="1" sz="2200">
+                <a:solidFill>
+                  <a:srgbClr val="000000"/>
+                </a:solidFill>
+                <a:latin typeface="Calibri"/>
+              </a:rPr>
+              <a:t>security</a:t>
+            </a:r>
+            <a:r>
+              <a:rPr sz="2200">
+                <a:solidFill>
+                  <a:srgbClr val="000000"/>
+                </a:solidFill>
+                <a:latin typeface="Calibri"/>
+              </a:rPr>
+              <a:t> measures for optimal </a:t>
+            </a:r>
+            <a:r>
+              <a:rPr b="1" sz="2200">
+                <a:solidFill>
+                  <a:srgbClr val="000000"/>
+                </a:solidFill>
+                <a:latin typeface="Calibri"/>
+              </a:rPr>
+              <a:t>performance</a:t>
+            </a:r>
+            <a:r>
+              <a:rPr sz="2200">
+                <a:solidFill>
+                  <a:srgbClr val="000000"/>
+                </a:solidFill>
+                <a:latin typeface="Calibri"/>
+              </a:rPr>
+              <a:t/>
+            </a:r>
+          </a:p>
+        </p:txBody>
+      </p:sp>
+      <p:sp>
+        <p:nvSpPr>
+          <p:cNvPr id="4" name="TextBox 3">
+            <a:extLst>
+              <a:ext uri="{FF2B5EF4-FFF2-40B4-BE49-F238E27FC236}">
+                <a16:creationId xmlns:a16="http://schemas.microsoft.com/office/drawing/2014/main" id="{31D49A63-113D-4D89-FCDF-641BB513C668}"/>
+              </a:ext>
+            </a:extLst>
+          </p:cNvPr>
+          <p:cNvSpPr txBox="1"/>
+          <p:nvPr/>
+        </p:nvSpPr>
+        <p:spPr>
+          <a:xfrm>
+            <a:off x="1637862" y="4114798"/>
+            <a:ext cx="4853165" cy="369332"/>
+          </a:xfrm>
+          <a:prstGeom prst="rect">
+            <a:avLst/>
+          </a:prstGeom>
+          <a:noFill/>
+        </p:spPr>
+        <p:txBody>
+          <a:bodyPr wrap="square" rtlCol="0" anchor="t" anchorCtr="0">
+            <a:spAutoFit/>
+          </a:bodyPr>
+          <a:lstStyle/>
+          <a:p>
+            <a:r>
+              <a:rPr lang="en-IN" dirty="0"/>
+              <a:t/>
+            </a:r>
+          </a:p>
+        </p:txBody>
+      </p:sp>
+      <p:sp>
+        <p:nvSpPr>
+          <p:cNvPr id="5" name="TextBox 4">
+            <a:extLst>
+              <a:ext uri="{FF2B5EF4-FFF2-40B4-BE49-F238E27FC236}">
+                <a16:creationId xmlns:a16="http://schemas.microsoft.com/office/drawing/2014/main" id="{5DDDEAD6-0A16-A764-2C88-3B42006212FC}"/>
+              </a:ext>
+            </a:extLst>
+          </p:cNvPr>
+          <p:cNvSpPr txBox="1"/>
+          <p:nvPr/>
+        </p:nvSpPr>
+        <p:spPr>
+          <a:xfrm>
+            <a:off x="6491027" y="4114797"/>
+            <a:ext cx="6444000" cy="3348000"/>
+          </a:xfrm>
+          <a:prstGeom prst="rect">
+            <a:avLst/>
+          </a:prstGeom>
+          <a:noFill/>
+        </p:spPr>
+        <p:txBody>
+          <a:bodyPr wrap="square" rtlCol="0" anchor="t" anchorCtr="0">
+            <a:spAutoFit/>
+          </a:bodyPr>
+          <a:lstStyle/>
+          <a:p>
+            <a:r>
+              <a:rPr lang="en-IN"/>
+              <a:t>status code: 404 -&gt; https://example.com/aws-conclusion.png</a:t>
+            </a:r>
+            <a:endParaRPr lang="en-IN" dirty="0"/>
           </a:p>
         </p:txBody>
       </p:sp>
@@ -5614,7 +6280,7 @@
                 <a:ea typeface="+mj-lt"/>
                 <a:cs typeface="+mj-lt"/>
               </a:rPr>
-              <a:t>Features of Python</a:t>
+              <a:t>Slide 2: History of AWS</a:t>
             </a:r>
             <a:endParaRPr lang="en-US" sz="3000" b="1" dirty="0">
               <a:latin typeface="Calibri"/>
@@ -5659,96 +6325,232 @@
               <a:lnSpc>
                 <a:spcPct val="150000"/>
               </a:lnSpc>
-              <a:spcAft>
-                <a:spcPts val="600"/>
-              </a:spcAft>
               <a:buFont typeface="Arial" panose="020B0604020202020204" pitchFamily="34" charset="0"/>
               <a:buChar char="•"/>
-              <a:defRPr sz="2200">
-                <a:latin typeface="Calibri"/>
-              </a:defRPr>
             </a:pPr>
             <a:r>
-              <a:t>Simple syntax</a:t>
-            </a:r>
-          </a:p>
-          <a:p>
-            <a:pPr>
+              <a:rPr sz="2200">
+                <a:solidFill>
+                  <a:srgbClr val="000000"/>
+                </a:solidFill>
+                <a:latin typeface="Calibri"/>
+              </a:rPr>
+              <a:t/>
+            </a:r>
+            <a:r>
+              <a:rPr b="1" sz="2200">
+                <a:solidFill>
+                  <a:srgbClr val="000000"/>
+                </a:solidFill>
+                <a:latin typeface="Calibri"/>
+              </a:rPr>
+              <a:t>2002</a:t>
+            </a:r>
+            <a:r>
+              <a:rPr sz="2200">
+                <a:solidFill>
+                  <a:srgbClr val="000000"/>
+                </a:solidFill>
+                <a:latin typeface="Calibri"/>
+              </a:rPr>
+              <a:t>: AWS launched as an internal project within Amazon</a:t>
+            </a:r>
+          </a:p>
+          <a:p>
+            <a:pPr algn="l">
               <a:spcAft>
-                <a:spcPts val="600"/>
+                <a:spcPts val="500"/>
               </a:spcAft>
-              <a:defRPr sz="2200">
-                <a:latin typeface="Calibri"/>
-              </a:defRPr>
             </a:pPr>
             <a:r>
-              <a:t>Large standard library</a:t>
-            </a:r>
-          </a:p>
-          <a:p>
-            <a:pPr>
+              <a:rPr sz="2200">
+                <a:solidFill>
+                  <a:srgbClr val="000000"/>
+                </a:solidFill>
+                <a:latin typeface="Calibri"/>
+              </a:rPr>
+              <a:t/>
+            </a:r>
+            <a:r>
+              <a:rPr b="1" sz="2200">
+                <a:solidFill>
+                  <a:srgbClr val="000000"/>
+                </a:solidFill>
+                <a:latin typeface="Calibri"/>
+              </a:rPr>
+              <a:t>2006</a:t>
+            </a:r>
+            <a:r>
+              <a:rPr sz="2200">
+                <a:solidFill>
+                  <a:srgbClr val="000000"/>
+                </a:solidFill>
+                <a:latin typeface="Calibri"/>
+              </a:rPr>
+              <a:t>: AWS introduced its first </a:t>
+            </a:r>
+            <a:r>
+              <a:rPr b="1" sz="2200">
+                <a:solidFill>
+                  <a:srgbClr val="000000"/>
+                </a:solidFill>
+                <a:latin typeface="Calibri"/>
+              </a:rPr>
+              <a:t>web services</a:t>
+            </a:r>
+            <a:r>
+              <a:rPr sz="2200">
+                <a:solidFill>
+                  <a:srgbClr val="000000"/>
+                </a:solidFill>
+                <a:latin typeface="Calibri"/>
+              </a:rPr>
+              <a:t>, including </a:t>
+            </a:r>
+            <a:r>
+              <a:rPr b="1" sz="2200">
+                <a:solidFill>
+                  <a:srgbClr val="000000"/>
+                </a:solidFill>
+                <a:latin typeface="Calibri"/>
+              </a:rPr>
+              <a:t>S3</a:t>
+            </a:r>
+            <a:r>
+              <a:rPr sz="2200">
+                <a:solidFill>
+                  <a:srgbClr val="000000"/>
+                </a:solidFill>
+                <a:latin typeface="Calibri"/>
+              </a:rPr>
+              <a:t> and </a:t>
+            </a:r>
+            <a:r>
+              <a:rPr b="1" sz="2200">
+                <a:solidFill>
+                  <a:srgbClr val="000000"/>
+                </a:solidFill>
+                <a:latin typeface="Calibri"/>
+              </a:rPr>
+              <a:t>SQS</a:t>
+            </a:r>
+            <a:r>
+              <a:rPr sz="2200">
+                <a:solidFill>
+                  <a:srgbClr val="000000"/>
+                </a:solidFill>
+                <a:latin typeface="Calibri"/>
+              </a:rPr>
+              <a:t/>
+            </a:r>
+          </a:p>
+          <a:p>
+            <a:pPr algn="l">
               <a:spcAft>
-                <a:spcPts val="600"/>
+                <a:spcPts val="500"/>
               </a:spcAft>
-              <a:defRPr sz="2200">
-                <a:latin typeface="Calibri"/>
-              </a:defRPr>
             </a:pPr>
             <a:r>
-              <a:t>Cross-platform compatibility</a:t>
-            </a:r>
-          </a:p>
-          <a:p>
-            <a:pPr>
-              <a:spcAft>
-                <a:spcPts val="600"/>
-              </a:spcAft>
-              <a:defRPr sz="2200">
-                <a:latin typeface="Calibri"/>
-              </a:defRPr>
-            </a:pPr>
-            <a:r>
-              <a:t>Extensive community support</a:t>
-            </a:r>
-          </a:p>
-        </p:txBody>
-      </p:sp>
-      <p:pic>
-        <p:nvPicPr>
-          <p:cNvPr id="5" name="Graphic 4" descr="What is an API? A Beginner's Guide to APIs | Postman">
+              <a:rPr sz="2200">
+                <a:solidFill>
+                  <a:srgbClr val="000000"/>
+                </a:solidFill>
+                <a:latin typeface="Calibri"/>
+              </a:rPr>
+              <a:t>Since then, AWS has grown to become one of the leading </a:t>
+            </a:r>
+            <a:r>
+              <a:rPr b="1" sz="2200">
+                <a:solidFill>
+                  <a:srgbClr val="000000"/>
+                </a:solidFill>
+                <a:latin typeface="Calibri"/>
+              </a:rPr>
+              <a:t>cloud providers</a:t>
+            </a:r>
+            <a:r>
+              <a:rPr sz="2200">
+                <a:solidFill>
+                  <a:srgbClr val="000000"/>
+                </a:solidFill>
+                <a:latin typeface="Calibri"/>
+              </a:rPr>
+              <a:t/>
+            </a:r>
+          </a:p>
+        </p:txBody>
+      </p:sp>
+      <p:sp>
+        <p:nvSpPr>
+          <p:cNvPr id="3" name="TextBox 2">
             <a:extLst>
               <a:ext uri="{FF2B5EF4-FFF2-40B4-BE49-F238E27FC236}">
-                <a16:creationId xmlns:a16="http://schemas.microsoft.com/office/drawing/2014/main" id="{5C6F5A16-0823-F05A-D22A-1FA513F1C5C1}"/>
+                <a16:creationId xmlns:a16="http://schemas.microsoft.com/office/drawing/2014/main" id="{8F9EFFD1-A05B-875F-E5A2-49BB86FB196E}"/>
               </a:ext>
             </a:extLst>
           </p:cNvPr>
-          <p:cNvPicPr>
-            <a:picLocks noChangeAspect="1"/>
-          </p:cNvPicPr>
+          <p:cNvSpPr txBox="1"/>
           <p:nvPr/>
-        </p:nvPicPr>
-        <p:blipFill>
-          <a:blip r:embed="rId2">
-            <a:extLst>
-              <a:ext uri="{96DAC541-7B7A-43D3-8B79-37D633B846F1}">
-                <asvg:svgBlip xmlns:asvg="http://schemas.microsoft.com/office/drawing/2016/SVG/main" r:embed="rId3"/>
-              </a:ext>
-            </a:extLst>
-          </a:blip>
-          <a:stretch>
-            <a:fillRect/>
-          </a:stretch>
-        </p:blipFill>
+        </p:nvSpPr>
         <p:spPr>
           <a:xfrm>
-            <a:off x="3235526" y="3550211"/>
-            <a:ext cx="6516545" cy="3977893"/>
+            <a:off x="1637862" y="4114798"/>
+            <a:ext cx="4853165" cy="369332"/>
           </a:xfrm>
           <a:prstGeom prst="rect">
             <a:avLst/>
           </a:prstGeom>
+          <a:noFill/>
         </p:spPr>
-      </p:pic>
+        <p:txBody>
+          <a:bodyPr wrap="square" rtlCol="0" anchor="t" anchorCtr="0">
+            <a:spAutoFit/>
+          </a:bodyPr>
+          <a:lstStyle/>
+          <a:p>
+            <a:r>
+              <a:rPr lang="en-IN" dirty="0"/>
+              <a:t/>
+            </a:r>
+          </a:p>
+        </p:txBody>
+      </p:sp>
+      <p:sp>
+        <p:nvSpPr>
+          <p:cNvPr id="6" name="TextBox 5">
+            <a:extLst>
+              <a:ext uri="{FF2B5EF4-FFF2-40B4-BE49-F238E27FC236}">
+                <a16:creationId xmlns:a16="http://schemas.microsoft.com/office/drawing/2014/main" id="{70857180-0292-65BC-3C56-78C680336268}"/>
+              </a:ext>
+            </a:extLst>
+          </p:cNvPr>
+          <p:cNvSpPr txBox="1"/>
+          <p:nvPr/>
+        </p:nvSpPr>
+        <p:spPr>
+          <a:xfrm>
+            <a:off x="6491027" y="4114797"/>
+            <a:ext cx="6444000" cy="3348000"/>
+          </a:xfrm>
+          <a:prstGeom prst="rect">
+            <a:avLst/>
+          </a:prstGeom>
+          <a:noFill/>
+        </p:spPr>
+        <p:txBody>
+          <a:bodyPr wrap="square" rtlCol="0" anchor="t" anchorCtr="0">
+            <a:spAutoFit/>
+          </a:bodyPr>
+          <a:lstStyle/>
+          <a:p>
+            <a:r>
+              <a:rPr lang="en-IN"/>
+              <a:t>status code: 404 -&gt; https://example.com/aws-timeline.png</a:t>
+            </a:r>
+            <a:endParaRPr lang="en-IN" dirty="0"/>
+          </a:p>
+        </p:txBody>
+      </p:sp>
     </p:spTree>
     <p:extLst>
       <p:ext uri="{BB962C8B-B14F-4D97-AF65-F5344CB8AC3E}">
@@ -5806,7 +6608,7 @@
                 <a:ea typeface="+mj-lt"/>
                 <a:cs typeface="+mj-lt"/>
               </a:rPr>
-              <a:t>Setting Up Python</a:t>
+              <a:t>Slide 3: Benefits of Using AWS</a:t>
             </a:r>
             <a:endParaRPr lang="en-US" sz="3000" b="1" dirty="0">
               <a:latin typeface="Calibri"/>
@@ -5818,10 +6620,10 @@
       </p:sp>
       <p:sp>
         <p:nvSpPr>
-          <p:cNvPr id="3" name="TextBox 2">
+          <p:cNvPr id="7" name="TextBox 6">
             <a:extLst>
               <a:ext uri="{FF2B5EF4-FFF2-40B4-BE49-F238E27FC236}">
-                <a16:creationId xmlns:a16="http://schemas.microsoft.com/office/drawing/2014/main" id="{1A401986-8100-506F-7786-0633B0D32ED7}"/>
+                <a16:creationId xmlns:a16="http://schemas.microsoft.com/office/drawing/2014/main" id="{D76FDF05-21BE-47CA-8E8E-B251B94A77D7}"/>
               </a:ext>
             </a:extLst>
           </p:cNvPr>
@@ -5830,8 +6632,8 @@
         </p:nvSpPr>
         <p:spPr>
           <a:xfrm>
-            <a:off x="2772136" y="1224022"/>
-            <a:ext cx="9097700" cy="547714"/>
+            <a:off x="2622428" y="1305911"/>
+            <a:ext cx="9396662" cy="547714"/>
           </a:xfrm>
           <a:prstGeom prst="rect">
             <a:avLst/>
@@ -5847,86 +6649,254 @@
           </a:bodyPr>
           <a:lstStyle/>
           <a:p>
-            <a:pPr marL="228600" indent="-228600">
+            <a:pPr marL="342900" indent="-342900">
               <a:lnSpc>
                 <a:spcPct val="150000"/>
               </a:lnSpc>
+              <a:buFont typeface="Arial" panose="020B0604020202020204" pitchFamily="34" charset="0"/>
+              <a:buChar char="•"/>
+            </a:pPr>
+            <a:r>
+              <a:rPr sz="2200">
+                <a:solidFill>
+                  <a:srgbClr val="000000"/>
+                </a:solidFill>
+                <a:latin typeface="Calibri"/>
+              </a:rPr>
+              <a:t/>
+            </a:r>
+            <a:r>
+              <a:rPr b="1" sz="2200">
+                <a:solidFill>
+                  <a:srgbClr val="000000"/>
+                </a:solidFill>
+                <a:latin typeface="Calibri"/>
+              </a:rPr>
+              <a:t>Scalability</a:t>
+            </a:r>
+            <a:r>
+              <a:rPr sz="2200">
+                <a:solidFill>
+                  <a:srgbClr val="000000"/>
+                </a:solidFill>
+                <a:latin typeface="Calibri"/>
+              </a:rPr>
+              <a:t>: easily scale up or down to meet changing </a:t>
+            </a:r>
+            <a:r>
+              <a:rPr b="1" sz="2200">
+                <a:solidFill>
+                  <a:srgbClr val="000000"/>
+                </a:solidFill>
+                <a:latin typeface="Calibri"/>
+              </a:rPr>
+              <a:t>workload</a:t>
+            </a:r>
+            <a:r>
+              <a:rPr sz="2200">
+                <a:solidFill>
+                  <a:srgbClr val="000000"/>
+                </a:solidFill>
+                <a:latin typeface="Calibri"/>
+              </a:rPr>
+              <a:t> demands</a:t>
+            </a:r>
+          </a:p>
+          <a:p>
+            <a:pPr algn="l">
               <a:spcAft>
-                <a:spcPts val="600"/>
+                <a:spcPts val="500"/>
               </a:spcAft>
-              <a:buFont typeface=""/>
-              <a:buChar char="•"/>
-              <a:defRPr sz="2200">
-                <a:latin typeface="Calibri"/>
-              </a:defRPr>
             </a:pPr>
             <a:r>
-              <a:t>Download and install Python from the official website</a:t>
-            </a:r>
-            <a:endParaRPr lang="en-US" dirty="0">
-              <a:latin typeface="Calibri"/>
-              <a:ea typeface="Calibri"/>
-              <a:cs typeface="Calibri"/>
-            </a:endParaRPr>
-          </a:p>
-          <a:p>
-            <a:pPr>
+              <a:rPr sz="2200">
+                <a:solidFill>
+                  <a:srgbClr val="000000"/>
+                </a:solidFill>
+                <a:latin typeface="Calibri"/>
+              </a:rPr>
+              <a:t/>
+            </a:r>
+            <a:r>
+              <a:rPr b="1" sz="2200">
+                <a:solidFill>
+                  <a:srgbClr val="000000"/>
+                </a:solidFill>
+                <a:latin typeface="Calibri"/>
+              </a:rPr>
+              <a:t>Cost-effectiveness</a:t>
+            </a:r>
+            <a:r>
+              <a:rPr sz="2200">
+                <a:solidFill>
+                  <a:srgbClr val="000000"/>
+                </a:solidFill>
+                <a:latin typeface="Calibri"/>
+              </a:rPr>
+              <a:t>: pay only for the </a:t>
+            </a:r>
+            <a:r>
+              <a:rPr b="1" sz="2200">
+                <a:solidFill>
+                  <a:srgbClr val="000000"/>
+                </a:solidFill>
+                <a:latin typeface="Calibri"/>
+              </a:rPr>
+              <a:t>resources</a:t>
+            </a:r>
+            <a:r>
+              <a:rPr sz="2200">
+                <a:solidFill>
+                  <a:srgbClr val="000000"/>
+                </a:solidFill>
+                <a:latin typeface="Calibri"/>
+              </a:rPr>
+              <a:t> you use</a:t>
+            </a:r>
+          </a:p>
+          <a:p>
+            <a:pPr algn="l">
               <a:spcAft>
-                <a:spcPts val="600"/>
+                <a:spcPts val="500"/>
               </a:spcAft>
-              <a:defRPr sz="2200">
-                <a:latin typeface="Calibri"/>
-              </a:defRPr>
             </a:pPr>
             <a:r>
-              <a:t>Choose a text editor or IDE (Integrated Development Environment)</a:t>
-            </a:r>
-          </a:p>
-          <a:p>
-            <a:pPr>
-              <a:spcAft>
-                <a:spcPts val="600"/>
-              </a:spcAft>
-              <a:defRPr sz="2200">
-                <a:latin typeface="Calibri"/>
-              </a:defRPr>
-            </a:pPr>
-            <a:r>
-              <a:t>Familiarize yourself with the interface</a:t>
-            </a:r>
-          </a:p>
-        </p:txBody>
-      </p:sp>
-      <p:pic>
-        <p:nvPicPr>
-          <p:cNvPr id="4" name="Picture 3" descr="A diagram of api workflow&#10;&#10;AI-generated content may be incorrect.">
+              <a:rPr sz="2200">
+                <a:solidFill>
+                  <a:srgbClr val="000000"/>
+                </a:solidFill>
+                <a:latin typeface="Calibri"/>
+              </a:rPr>
+              <a:t/>
+            </a:r>
+            <a:r>
+              <a:rPr b="1" sz="2200">
+                <a:solidFill>
+                  <a:srgbClr val="000000"/>
+                </a:solidFill>
+                <a:latin typeface="Calibri"/>
+              </a:rPr>
+              <a:t>Reliability</a:t>
+            </a:r>
+            <a:r>
+              <a:rPr sz="2200">
+                <a:solidFill>
+                  <a:srgbClr val="000000"/>
+                </a:solidFill>
+                <a:latin typeface="Calibri"/>
+              </a:rPr>
+              <a:t>: built-in </a:t>
+            </a:r>
+            <a:r>
+              <a:rPr b="1" sz="2200">
+                <a:solidFill>
+                  <a:srgbClr val="000000"/>
+                </a:solidFill>
+                <a:latin typeface="Calibri"/>
+              </a:rPr>
+              <a:t>fault tolerance</a:t>
+            </a:r>
+            <a:r>
+              <a:rPr sz="2200">
+                <a:solidFill>
+                  <a:srgbClr val="000000"/>
+                </a:solidFill>
+                <a:latin typeface="Calibri"/>
+              </a:rPr>
+              <a:t> and </a:t>
+            </a:r>
+            <a:r>
+              <a:rPr b="1" sz="2200">
+                <a:solidFill>
+                  <a:srgbClr val="000000"/>
+                </a:solidFill>
+                <a:latin typeface="Calibri"/>
+              </a:rPr>
+              <a:t>disaster recovery</a:t>
+            </a:r>
+            <a:r>
+              <a:rPr sz="2200">
+                <a:solidFill>
+                  <a:srgbClr val="000000"/>
+                </a:solidFill>
+                <a:latin typeface="Calibri"/>
+              </a:rPr>
+              <a:t> capabilities</a:t>
+            </a:r>
+          </a:p>
+        </p:txBody>
+      </p:sp>
+      <p:sp>
+        <p:nvSpPr>
+          <p:cNvPr id="4" name="TextBox 3">
             <a:extLst>
               <a:ext uri="{FF2B5EF4-FFF2-40B4-BE49-F238E27FC236}">
-                <a16:creationId xmlns:a16="http://schemas.microsoft.com/office/drawing/2014/main" id="{362466A9-E39F-5206-C3DB-27E49C006FE8}"/>
+                <a16:creationId xmlns:a16="http://schemas.microsoft.com/office/drawing/2014/main" id="{31D49A63-113D-4D89-FCDF-641BB513C668}"/>
               </a:ext>
             </a:extLst>
           </p:cNvPr>
-          <p:cNvPicPr>
-            <a:picLocks noChangeAspect="1"/>
-          </p:cNvPicPr>
+          <p:cNvSpPr txBox="1"/>
           <p:nvPr/>
-        </p:nvPicPr>
-        <p:blipFill>
-          <a:blip r:embed="rId2"/>
-          <a:stretch>
-            <a:fillRect/>
-          </a:stretch>
-        </p:blipFill>
+        </p:nvSpPr>
         <p:spPr>
           <a:xfrm>
-            <a:off x="2415251" y="4813983"/>
-            <a:ext cx="9093844" cy="2768520"/>
+            <a:off x="1637862" y="4114798"/>
+            <a:ext cx="4853165" cy="369332"/>
           </a:xfrm>
           <a:prstGeom prst="rect">
             <a:avLst/>
           </a:prstGeom>
+          <a:noFill/>
         </p:spPr>
-      </p:pic>
+        <p:txBody>
+          <a:bodyPr wrap="square" rtlCol="0" anchor="t" anchorCtr="0">
+            <a:spAutoFit/>
+          </a:bodyPr>
+          <a:lstStyle/>
+          <a:p>
+            <a:r>
+              <a:rPr lang="en-IN" dirty="0"/>
+              <a:t/>
+            </a:r>
+          </a:p>
+        </p:txBody>
+      </p:sp>
+      <p:sp>
+        <p:nvSpPr>
+          <p:cNvPr id="5" name="TextBox 4">
+            <a:extLst>
+              <a:ext uri="{FF2B5EF4-FFF2-40B4-BE49-F238E27FC236}">
+                <a16:creationId xmlns:a16="http://schemas.microsoft.com/office/drawing/2014/main" id="{5DDDEAD6-0A16-A764-2C88-3B42006212FC}"/>
+              </a:ext>
+            </a:extLst>
+          </p:cNvPr>
+          <p:cNvSpPr txBox="1"/>
+          <p:nvPr/>
+        </p:nvSpPr>
+        <p:spPr>
+          <a:xfrm>
+            <a:off x="6491027" y="4114797"/>
+            <a:ext cx="6444000" cy="3348000"/>
+          </a:xfrm>
+          <a:prstGeom prst="rect">
+            <a:avLst/>
+          </a:prstGeom>
+          <a:noFill/>
+        </p:spPr>
+        <p:txBody>
+          <a:bodyPr wrap="square" rtlCol="0" anchor="t" anchorCtr="0">
+            <a:spAutoFit/>
+          </a:bodyPr>
+          <a:lstStyle/>
+          <a:p>
+            <a:r>
+              <a:rPr lang="en-IN"/>
+              <a:t>status code: 404 -&gt; https://example.com/aws-benefits.png</a:t>
+            </a:r>
+            <a:endParaRPr lang="en-IN" dirty="0"/>
+          </a:p>
+        </p:txBody>
+      </p:sp>
     </p:spTree>
     <p:extLst>
       <p:ext uri="{BB962C8B-B14F-4D97-AF65-F5344CB8AC3E}">
@@ -5941,7 +6911,7 @@
 </file>
 
 <file path=ppt/slides/slide4.xml><?xml version="1.0" encoding="utf-8"?>
-<p:sld xmlns:a="http://schemas.openxmlformats.org/drawingml/2006/main" xmlns:r="http://schemas.openxmlformats.org/officeDocument/2006/relationships" xmlns:p="http://schemas.openxmlformats.org/presentationml/2006/main">
+<p:sld xmlns:a="http://schemas.openxmlformats.org/drawingml/2006/main" xmlns:p="http://schemas.openxmlformats.org/presentationml/2006/main" xmlns:r="http://schemas.openxmlformats.org/officeDocument/2006/relationships">
   <p:cSld>
     <p:spTree>
       <p:nvGrpSpPr>
@@ -5949,20 +6919,13 @@
         <p:cNvGrpSpPr/>
         <p:nvPr/>
       </p:nvGrpSpPr>
-      <p:grpSpPr>
-        <a:xfrm>
-          <a:off x="0" y="0"/>
-          <a:ext cx="0" cy="0"/>
-          <a:chOff x="0" y="0"/>
-          <a:chExt cx="0" cy="0"/>
-        </a:xfrm>
-      </p:grpSpPr>
+      <p:grpSpPr/>
       <p:sp>
         <p:nvSpPr>
           <p:cNvPr id="2" name="Title 1">
             <a:extLst>
               <a:ext uri="{FF2B5EF4-FFF2-40B4-BE49-F238E27FC236}">
-                <a16:creationId xmlns:a16="http://schemas.microsoft.com/office/drawing/2014/main" id="{4E497125-E3B1-D828-369D-3DC2E2EB20A4}"/>
+                <a16:creationId xmlns:a16="http://schemas.microsoft.com/office/drawing/2014/main" id="{8C546A1E-3282-3F02-B1AB-51E7A78F8696}"/>
               </a:ext>
             </a:extLst>
           </p:cNvPr>
@@ -5981,20 +6944,25 @@
             <a:r>
               <a:rPr lang="en-US" sz="3000" b="1" dirty="0">
                 <a:latin typeface="Calibri"/>
-                <a:ea typeface="Calibri"/>
-                <a:cs typeface="Calibri"/>
-              </a:rPr>
-              <a:t>Basic Syntax</a:t>
-            </a:r>
-          </a:p>
-        </p:txBody>
-      </p:sp>
-      <p:sp>
-        <p:nvSpPr>
-          <p:cNvPr id="3" name="TextBox 2">
+                <a:ea typeface="+mj-lt"/>
+                <a:cs typeface="+mj-lt"/>
+              </a:rPr>
+              <a:t>Slide 4: AWS Services</a:t>
+            </a:r>
+            <a:endParaRPr lang="en-US" sz="3000" b="1" dirty="0">
+              <a:latin typeface="Calibri"/>
+              <a:ea typeface="Calibri"/>
+              <a:cs typeface="Calibri"/>
+            </a:endParaRPr>
+          </a:p>
+        </p:txBody>
+      </p:sp>
+      <p:sp>
+        <p:nvSpPr>
+          <p:cNvPr id="7" name="TextBox 6">
             <a:extLst>
               <a:ext uri="{FF2B5EF4-FFF2-40B4-BE49-F238E27FC236}">
-                <a16:creationId xmlns:a16="http://schemas.microsoft.com/office/drawing/2014/main" id="{56D42430-7BAC-C453-56AF-1D9683F68982}"/>
+                <a16:creationId xmlns:a16="http://schemas.microsoft.com/office/drawing/2014/main" id="{D76FDF05-21BE-47CA-8E8E-B251B94A77D7}"/>
               </a:ext>
             </a:extLst>
           </p:cNvPr>
@@ -6003,8 +6971,8 @@
         </p:nvSpPr>
         <p:spPr>
           <a:xfrm>
-            <a:off x="2216552" y="1281897"/>
-            <a:ext cx="9699584" cy="547714"/>
+            <a:off x="2622428" y="1305911"/>
+            <a:ext cx="9396662" cy="547714"/>
           </a:xfrm>
           <a:prstGeom prst="rect">
             <a:avLst/>
@@ -6020,92 +6988,345 @@
           </a:bodyPr>
           <a:lstStyle/>
           <a:p>
-            <a:pPr marL="228600" indent="-228600">
+            <a:pPr marL="342900" indent="-342900">
               <a:lnSpc>
                 <a:spcPct val="150000"/>
               </a:lnSpc>
+              <a:buFont typeface="Arial" panose="020B0604020202020204" pitchFamily="34" charset="0"/>
+              <a:buChar char="•"/>
+            </a:pPr>
+            <a:r>
+              <a:rPr sz="2200">
+                <a:solidFill>
+                  <a:srgbClr val="000000"/>
+                </a:solidFill>
+                <a:latin typeface="Calibri"/>
+              </a:rPr>
+              <a:t/>
+            </a:r>
+            <a:r>
+              <a:rPr b="1" sz="2200">
+                <a:solidFill>
+                  <a:srgbClr val="000000"/>
+                </a:solidFill>
+                <a:latin typeface="Calibri"/>
+              </a:rPr>
+              <a:t>Compute Services</a:t>
+            </a:r>
+            <a:r>
+              <a:rPr sz="2200">
+                <a:solidFill>
+                  <a:srgbClr val="000000"/>
+                </a:solidFill>
+                <a:latin typeface="Calibri"/>
+              </a:rPr>
+              <a:t>: </a:t>
+            </a:r>
+            <a:r>
+              <a:rPr b="1" sz="2200">
+                <a:solidFill>
+                  <a:srgbClr val="000000"/>
+                </a:solidFill>
+                <a:latin typeface="Calibri"/>
+              </a:rPr>
+              <a:t>EC2</a:t>
+            </a:r>
+            <a:r>
+              <a:rPr sz="2200">
+                <a:solidFill>
+                  <a:srgbClr val="000000"/>
+                </a:solidFill>
+                <a:latin typeface="Calibri"/>
+              </a:rPr>
+              <a:t>, </a:t>
+            </a:r>
+            <a:r>
+              <a:rPr b="1" sz="2200">
+                <a:solidFill>
+                  <a:srgbClr val="000000"/>
+                </a:solidFill>
+                <a:latin typeface="Calibri"/>
+              </a:rPr>
+              <a:t>Lambda</a:t>
+            </a:r>
+            <a:r>
+              <a:rPr sz="2200">
+                <a:solidFill>
+                  <a:srgbClr val="000000"/>
+                </a:solidFill>
+                <a:latin typeface="Calibri"/>
+              </a:rPr>
+              <a:t>, and </a:t>
+            </a:r>
+            <a:r>
+              <a:rPr b="1" sz="2200">
+                <a:solidFill>
+                  <a:srgbClr val="000000"/>
+                </a:solidFill>
+                <a:latin typeface="Calibri"/>
+              </a:rPr>
+              <a:t>Elastic Beanstalk</a:t>
+            </a:r>
+            <a:r>
+              <a:rPr sz="2200">
+                <a:solidFill>
+                  <a:srgbClr val="000000"/>
+                </a:solidFill>
+                <a:latin typeface="Calibri"/>
+              </a:rPr>
+              <a:t/>
+            </a:r>
+          </a:p>
+          <a:p>
+            <a:pPr algn="l">
               <a:spcAft>
-                <a:spcPts val="600"/>
+                <a:spcPts val="500"/>
               </a:spcAft>
-              <a:buFont typeface=""/>
-              <a:buChar char="•"/>
-              <a:defRPr sz="2200">
-                <a:latin typeface="Calibri"/>
-              </a:defRPr>
             </a:pPr>
             <a:r>
-              <a:t>Indentation is used to define code blocks</a:t>
-            </a:r>
-            <a:endParaRPr lang="en-US" sz="2200" b="1" dirty="0">
-              <a:latin typeface="Calibri"/>
-              <a:ea typeface="Calibri"/>
-              <a:cs typeface="Calibri"/>
-            </a:endParaRPr>
-          </a:p>
-          <a:p>
-            <a:pPr>
+              <a:rPr sz="2200">
+                <a:solidFill>
+                  <a:srgbClr val="000000"/>
+                </a:solidFill>
+                <a:latin typeface="Calibri"/>
+              </a:rPr>
+              <a:t/>
+            </a:r>
+            <a:r>
+              <a:rPr b="1" sz="2200">
+                <a:solidFill>
+                  <a:srgbClr val="000000"/>
+                </a:solidFill>
+                <a:latin typeface="Calibri"/>
+              </a:rPr>
+              <a:t>Storage Services</a:t>
+            </a:r>
+            <a:r>
+              <a:rPr sz="2200">
+                <a:solidFill>
+                  <a:srgbClr val="000000"/>
+                </a:solidFill>
+                <a:latin typeface="Calibri"/>
+              </a:rPr>
+              <a:t>: </a:t>
+            </a:r>
+            <a:r>
+              <a:rPr b="1" sz="2200">
+                <a:solidFill>
+                  <a:srgbClr val="000000"/>
+                </a:solidFill>
+                <a:latin typeface="Calibri"/>
+              </a:rPr>
+              <a:t>S3</a:t>
+            </a:r>
+            <a:r>
+              <a:rPr sz="2200">
+                <a:solidFill>
+                  <a:srgbClr val="000000"/>
+                </a:solidFill>
+                <a:latin typeface="Calibri"/>
+              </a:rPr>
+              <a:t>, </a:t>
+            </a:r>
+            <a:r>
+              <a:rPr b="1" sz="2200">
+                <a:solidFill>
+                  <a:srgbClr val="000000"/>
+                </a:solidFill>
+                <a:latin typeface="Calibri"/>
+              </a:rPr>
+              <a:t>EBS</a:t>
+            </a:r>
+            <a:r>
+              <a:rPr sz="2200">
+                <a:solidFill>
+                  <a:srgbClr val="000000"/>
+                </a:solidFill>
+                <a:latin typeface="Calibri"/>
+              </a:rPr>
+              <a:t>, and </a:t>
+            </a:r>
+            <a:r>
+              <a:rPr b="1" sz="2200">
+                <a:solidFill>
+                  <a:srgbClr val="000000"/>
+                </a:solidFill>
+                <a:latin typeface="Calibri"/>
+              </a:rPr>
+              <a:t>EFS</a:t>
+            </a:r>
+            <a:r>
+              <a:rPr sz="2200">
+                <a:solidFill>
+                  <a:srgbClr val="000000"/>
+                </a:solidFill>
+                <a:latin typeface="Calibri"/>
+              </a:rPr>
+              <a:t/>
+            </a:r>
+          </a:p>
+          <a:p>
+            <a:pPr algn="l">
               <a:spcAft>
-                <a:spcPts val="600"/>
+                <a:spcPts val="500"/>
               </a:spcAft>
-              <a:defRPr sz="2200">
-                <a:latin typeface="Calibri"/>
-              </a:defRPr>
             </a:pPr>
             <a:r>
-              <a:t>Variables are used to store and manipulate data</a:t>
-            </a:r>
-          </a:p>
-          <a:p>
-            <a:pPr>
-              <a:spcAft>
-                <a:spcPts val="600"/>
-              </a:spcAft>
-              <a:defRPr sz="2200">
-                <a:latin typeface="Calibri"/>
-              </a:defRPr>
-            </a:pPr>
-            <a:r>
-              <a:t>Print function is used to output text</a:t>
-            </a:r>
-          </a:p>
-        </p:txBody>
-      </p:sp>
-      <p:pic>
-        <p:nvPicPr>
-          <p:cNvPr id="4" name="Picture 3" descr="A screenshot of a computer program&#10;&#10;AI-generated content may be incorrect.">
+              <a:rPr sz="2200">
+                <a:solidFill>
+                  <a:srgbClr val="000000"/>
+                </a:solidFill>
+                <a:latin typeface="Calibri"/>
+              </a:rPr>
+              <a:t/>
+            </a:r>
+            <a:r>
+              <a:rPr b="1" sz="2200">
+                <a:solidFill>
+                  <a:srgbClr val="000000"/>
+                </a:solidFill>
+                <a:latin typeface="Calibri"/>
+              </a:rPr>
+              <a:t>Database Services</a:t>
+            </a:r>
+            <a:r>
+              <a:rPr sz="2200">
+                <a:solidFill>
+                  <a:srgbClr val="000000"/>
+                </a:solidFill>
+                <a:latin typeface="Calibri"/>
+              </a:rPr>
+              <a:t>: </a:t>
+            </a:r>
+            <a:r>
+              <a:rPr b="1" sz="2200">
+                <a:solidFill>
+                  <a:srgbClr val="000000"/>
+                </a:solidFill>
+                <a:latin typeface="Calibri"/>
+              </a:rPr>
+              <a:t>RDS</a:t>
+            </a:r>
+            <a:r>
+              <a:rPr sz="2200">
+                <a:solidFill>
+                  <a:srgbClr val="000000"/>
+                </a:solidFill>
+                <a:latin typeface="Calibri"/>
+              </a:rPr>
+              <a:t>, </a:t>
+            </a:r>
+            <a:r>
+              <a:rPr b="1" sz="2200">
+                <a:solidFill>
+                  <a:srgbClr val="000000"/>
+                </a:solidFill>
+                <a:latin typeface="Calibri"/>
+              </a:rPr>
+              <a:t>DynamoDB</a:t>
+            </a:r>
+            <a:r>
+              <a:rPr sz="2200">
+                <a:solidFill>
+                  <a:srgbClr val="000000"/>
+                </a:solidFill>
+                <a:latin typeface="Calibri"/>
+              </a:rPr>
+              <a:t>, and </a:t>
+            </a:r>
+            <a:r>
+              <a:rPr b="1" sz="2200">
+                <a:solidFill>
+                  <a:srgbClr val="000000"/>
+                </a:solidFill>
+                <a:latin typeface="Calibri"/>
+              </a:rPr>
+              <a:t>DocumentDB</a:t>
+            </a:r>
+            <a:r>
+              <a:rPr sz="2200">
+                <a:solidFill>
+                  <a:srgbClr val="000000"/>
+                </a:solidFill>
+                <a:latin typeface="Calibri"/>
+              </a:rPr>
+              <a:t/>
+            </a:r>
+          </a:p>
+        </p:txBody>
+      </p:sp>
+      <p:sp>
+        <p:nvSpPr>
+          <p:cNvPr id="4" name="TextBox 3">
             <a:extLst>
               <a:ext uri="{FF2B5EF4-FFF2-40B4-BE49-F238E27FC236}">
-                <a16:creationId xmlns:a16="http://schemas.microsoft.com/office/drawing/2014/main" id="{758D1BAE-12FD-7D82-BBF6-6FAD5DACF15A}"/>
+                <a16:creationId xmlns:a16="http://schemas.microsoft.com/office/drawing/2014/main" id="{31D49A63-113D-4D89-FCDF-641BB513C668}"/>
               </a:ext>
             </a:extLst>
           </p:cNvPr>
-          <p:cNvPicPr>
-            <a:picLocks noChangeAspect="1"/>
-          </p:cNvPicPr>
+          <p:cNvSpPr txBox="1"/>
           <p:nvPr/>
-        </p:nvPicPr>
-        <p:blipFill>
-          <a:blip r:embed="rId2"/>
-          <a:stretch>
-            <a:fillRect/>
-          </a:stretch>
-        </p:blipFill>
+        </p:nvSpPr>
         <p:spPr>
           <a:xfrm>
-            <a:off x="4165259" y="4368719"/>
-            <a:ext cx="5721150" cy="3068739"/>
+            <a:off x="1637862" y="4114798"/>
+            <a:ext cx="4853165" cy="369332"/>
           </a:xfrm>
           <a:prstGeom prst="rect">
             <a:avLst/>
           </a:prstGeom>
+          <a:noFill/>
         </p:spPr>
-      </p:pic>
+        <p:txBody>
+          <a:bodyPr wrap="square" rtlCol="0" anchor="t" anchorCtr="0">
+            <a:spAutoFit/>
+          </a:bodyPr>
+          <a:lstStyle/>
+          <a:p>
+            <a:r>
+              <a:rPr lang="en-IN" dirty="0"/>
+              <a:t/>
+            </a:r>
+          </a:p>
+        </p:txBody>
+      </p:sp>
+      <p:sp>
+        <p:nvSpPr>
+          <p:cNvPr id="5" name="TextBox 4">
+            <a:extLst>
+              <a:ext uri="{FF2B5EF4-FFF2-40B4-BE49-F238E27FC236}">
+                <a16:creationId xmlns:a16="http://schemas.microsoft.com/office/drawing/2014/main" id="{5DDDEAD6-0A16-A764-2C88-3B42006212FC}"/>
+              </a:ext>
+            </a:extLst>
+          </p:cNvPr>
+          <p:cNvSpPr txBox="1"/>
+          <p:nvPr/>
+        </p:nvSpPr>
+        <p:spPr>
+          <a:xfrm>
+            <a:off x="6491027" y="4114797"/>
+            <a:ext cx="6444000" cy="3348000"/>
+          </a:xfrm>
+          <a:prstGeom prst="rect">
+            <a:avLst/>
+          </a:prstGeom>
+          <a:noFill/>
+        </p:spPr>
+        <p:txBody>
+          <a:bodyPr wrap="square" rtlCol="0" anchor="t" anchorCtr="0">
+            <a:spAutoFit/>
+          </a:bodyPr>
+          <a:lstStyle/>
+          <a:p>
+            <a:r>
+              <a:rPr lang="en-IN"/>
+              <a:t>status code: 404 -&gt; https://example.com/aws-services.png</a:t>
+            </a:r>
+            <a:endParaRPr lang="en-IN" dirty="0"/>
+          </a:p>
+        </p:txBody>
+      </p:sp>
     </p:spTree>
-    <p:extLst>
-      <p:ext uri="{BB962C8B-B14F-4D97-AF65-F5344CB8AC3E}">
-        <p14:creationId xmlns:p14="http://schemas.microsoft.com/office/powerpoint/2010/main" val="1320938549"/>
-      </p:ext>
-    </p:extLst>
   </p:cSld>
   <p:clrMapOvr>
     <a:masterClrMapping/>
@@ -6114,7 +7335,7 @@
 </file>
 
 <file path=ppt/slides/slide5.xml><?xml version="1.0" encoding="utf-8"?>
-<p:sld xmlns:a="http://schemas.openxmlformats.org/drawingml/2006/main" xmlns:r="http://schemas.openxmlformats.org/officeDocument/2006/relationships" xmlns:p="http://schemas.openxmlformats.org/presentationml/2006/main">
+<p:sld xmlns:a="http://schemas.openxmlformats.org/drawingml/2006/main" xmlns:p="http://schemas.openxmlformats.org/presentationml/2006/main" xmlns:r="http://schemas.openxmlformats.org/officeDocument/2006/relationships">
   <p:cSld>
     <p:spTree>
       <p:nvGrpSpPr>
@@ -6122,20 +7343,13 @@
         <p:cNvGrpSpPr/>
         <p:nvPr/>
       </p:nvGrpSpPr>
-      <p:grpSpPr>
-        <a:xfrm>
-          <a:off x="0" y="0"/>
-          <a:ext cx="0" cy="0"/>
-          <a:chOff x="0" y="0"/>
-          <a:chExt cx="0" cy="0"/>
-        </a:xfrm>
-      </p:grpSpPr>
+      <p:grpSpPr/>
       <p:sp>
         <p:nvSpPr>
           <p:cNvPr id="2" name="Title 1">
             <a:extLst>
               <a:ext uri="{FF2B5EF4-FFF2-40B4-BE49-F238E27FC236}">
-                <a16:creationId xmlns:a16="http://schemas.microsoft.com/office/drawing/2014/main" id="{B6F378F6-5A71-8761-EF1F-CFA94B8AED2C}"/>
+                <a16:creationId xmlns:a16="http://schemas.microsoft.com/office/drawing/2014/main" id="{8C546A1E-3282-3F02-B1AB-51E7A78F8696}"/>
               </a:ext>
             </a:extLst>
           </p:cNvPr>
@@ -6157,7 +7371,7 @@
                 <a:ea typeface="+mj-lt"/>
                 <a:cs typeface="+mj-lt"/>
               </a:rPr>
-              <a:t>Data Types</a:t>
+              <a:t>Slide 5: AWS Security</a:t>
             </a:r>
             <a:endParaRPr lang="en-US" sz="3000" b="1" dirty="0">
               <a:latin typeface="Calibri"/>
@@ -6169,10 +7383,10 @@
       </p:sp>
       <p:sp>
         <p:nvSpPr>
-          <p:cNvPr id="3" name="TextBox 2">
+          <p:cNvPr id="7" name="TextBox 6">
             <a:extLst>
               <a:ext uri="{FF2B5EF4-FFF2-40B4-BE49-F238E27FC236}">
-                <a16:creationId xmlns:a16="http://schemas.microsoft.com/office/drawing/2014/main" id="{749FDD02-E8D4-57CB-E416-EF8180A6DCA3}"/>
+                <a16:creationId xmlns:a16="http://schemas.microsoft.com/office/drawing/2014/main" id="{D76FDF05-21BE-47CA-8E8E-B251B94A77D7}"/>
               </a:ext>
             </a:extLst>
           </p:cNvPr>
@@ -6181,8 +7395,8 @@
         </p:nvSpPr>
         <p:spPr>
           <a:xfrm>
-            <a:off x="2129589" y="1455821"/>
-            <a:ext cx="8915399" cy="547714"/>
+            <a:off x="2622428" y="1305911"/>
+            <a:ext cx="9396662" cy="547714"/>
           </a:xfrm>
           <a:prstGeom prst="rect">
             <a:avLst/>
@@ -6198,100 +7412,225 @@
           </a:bodyPr>
           <a:lstStyle/>
           <a:p>
-            <a:pPr marL="228600" indent="-228600">
+            <a:pPr marL="342900" indent="-342900">
               <a:lnSpc>
                 <a:spcPct val="150000"/>
               </a:lnSpc>
+              <a:buFont typeface="Arial" panose="020B0604020202020204" pitchFamily="34" charset="0"/>
+              <a:buChar char="•"/>
+            </a:pPr>
+            <a:r>
+              <a:rPr sz="2200">
+                <a:solidFill>
+                  <a:srgbClr val="000000"/>
+                </a:solidFill>
+                <a:latin typeface="Calibri"/>
+              </a:rPr>
+              <a:t/>
+            </a:r>
+            <a:r>
+              <a:rPr b="1" sz="2200">
+                <a:solidFill>
+                  <a:srgbClr val="000000"/>
+                </a:solidFill>
+                <a:latin typeface="Calibri"/>
+              </a:rPr>
+              <a:t>IAM</a:t>
+            </a:r>
+            <a:r>
+              <a:rPr sz="2200">
+                <a:solidFill>
+                  <a:srgbClr val="000000"/>
+                </a:solidFill>
+                <a:latin typeface="Calibri"/>
+              </a:rPr>
+              <a:t>: Identity and Access Management for </a:t>
+            </a:r>
+            <a:r>
+              <a:rPr b="1" sz="2200">
+                <a:solidFill>
+                  <a:srgbClr val="000000"/>
+                </a:solidFill>
+                <a:latin typeface="Calibri"/>
+              </a:rPr>
+              <a:t>access control</a:t>
+            </a:r>
+            <a:r>
+              <a:rPr sz="2200">
+                <a:solidFill>
+                  <a:srgbClr val="000000"/>
+                </a:solidFill>
+                <a:latin typeface="Calibri"/>
+              </a:rPr>
+              <a:t/>
+            </a:r>
+          </a:p>
+          <a:p>
+            <a:pPr algn="l">
               <a:spcAft>
-                <a:spcPts val="600"/>
+                <a:spcPts val="500"/>
               </a:spcAft>
-              <a:buFont typeface=""/>
-              <a:buChar char="•"/>
-              <a:defRPr sz="2200">
-                <a:latin typeface="Calibri"/>
-              </a:defRPr>
             </a:pPr>
             <a:r>
-              <a:t>Integers (int)</a:t>
-            </a:r>
-          </a:p>
-          <a:p>
-            <a:pPr>
+              <a:rPr sz="2200">
+                <a:solidFill>
+                  <a:srgbClr val="000000"/>
+                </a:solidFill>
+                <a:latin typeface="Calibri"/>
+              </a:rPr>
+              <a:t/>
+            </a:r>
+            <a:r>
+              <a:rPr b="1" sz="2200">
+                <a:solidFill>
+                  <a:srgbClr val="000000"/>
+                </a:solidFill>
+                <a:latin typeface="Calibri"/>
+              </a:rPr>
+              <a:t>Cognito</a:t>
+            </a:r>
+            <a:r>
+              <a:rPr sz="2200">
+                <a:solidFill>
+                  <a:srgbClr val="000000"/>
+                </a:solidFill>
+                <a:latin typeface="Calibri"/>
+              </a:rPr>
+              <a:t>: user identity and </a:t>
+            </a:r>
+            <a:r>
+              <a:rPr b="1" sz="2200">
+                <a:solidFill>
+                  <a:srgbClr val="000000"/>
+                </a:solidFill>
+                <a:latin typeface="Calibri"/>
+              </a:rPr>
+              <a:t>access management</a:t>
+            </a:r>
+            <a:r>
+              <a:rPr sz="2200">
+                <a:solidFill>
+                  <a:srgbClr val="000000"/>
+                </a:solidFill>
+                <a:latin typeface="Calibri"/>
+              </a:rPr>
+              <a:t> for </a:t>
+            </a:r>
+            <a:r>
+              <a:rPr b="1" sz="2200">
+                <a:solidFill>
+                  <a:srgbClr val="000000"/>
+                </a:solidFill>
+                <a:latin typeface="Calibri"/>
+              </a:rPr>
+              <a:t>web</a:t>
+            </a:r>
+            <a:r>
+              <a:rPr sz="2200">
+                <a:solidFill>
+                  <a:srgbClr val="000000"/>
+                </a:solidFill>
+                <a:latin typeface="Calibri"/>
+              </a:rPr>
+              <a:t> and </a:t>
+            </a:r>
+            <a:r>
+              <a:rPr b="1" sz="2200">
+                <a:solidFill>
+                  <a:srgbClr val="000000"/>
+                </a:solidFill>
+                <a:latin typeface="Calibri"/>
+              </a:rPr>
+              <a:t>mobile</a:t>
+            </a:r>
+            <a:r>
+              <a:rPr sz="2200">
+                <a:solidFill>
+                  <a:srgbClr val="000000"/>
+                </a:solidFill>
+                <a:latin typeface="Calibri"/>
+              </a:rPr>
+              <a:t> apps</a:t>
+            </a:r>
+          </a:p>
+          <a:p>
+            <a:pPr algn="l">
               <a:spcAft>
-                <a:spcPts val="600"/>
+                <a:spcPts val="500"/>
               </a:spcAft>
-              <a:defRPr sz="2200">
-                <a:latin typeface="Calibri"/>
-              </a:defRPr>
             </a:pPr>
             <a:r>
-              <a:t>Floats (float)</a:t>
-            </a:r>
-          </a:p>
-          <a:p>
-            <a:pPr>
-              <a:spcAft>
-                <a:spcPts val="600"/>
-              </a:spcAft>
-              <a:defRPr sz="2200">
-                <a:latin typeface="Calibri"/>
-              </a:defRPr>
-            </a:pPr>
-            <a:r>
-              <a:t>Strings (str)</a:t>
-            </a:r>
-          </a:p>
-          <a:p>
-            <a:pPr>
-              <a:spcAft>
-                <a:spcPts val="600"/>
-              </a:spcAft>
-              <a:defRPr sz="2200">
-                <a:latin typeface="Calibri"/>
-              </a:defRPr>
-            </a:pPr>
-            <a:r>
-              <a:t>Boolean (bool)</a:t>
-            </a:r>
-          </a:p>
-        </p:txBody>
-      </p:sp>
-      <p:pic>
-        <p:nvPicPr>
-          <p:cNvPr id="4" name="Picture 3" descr="A screenshot of a computer code&#10;&#10;AI-generated content may be incorrect.">
+              <a:rPr sz="2200">
+                <a:solidFill>
+                  <a:srgbClr val="000000"/>
+                </a:solidFill>
+                <a:latin typeface="Calibri"/>
+              </a:rPr>
+              <a:t/>
+            </a:r>
+            <a:r>
+              <a:rPr b="1" sz="2200">
+                <a:solidFill>
+                  <a:srgbClr val="000000"/>
+                </a:solidFill>
+                <a:latin typeface="Calibri"/>
+              </a:rPr>
+              <a:t>Inspector</a:t>
+            </a:r>
+            <a:r>
+              <a:rPr sz="2200">
+                <a:solidFill>
+                  <a:srgbClr val="000000"/>
+                </a:solidFill>
+                <a:latin typeface="Calibri"/>
+              </a:rPr>
+              <a:t>: </a:t>
+            </a:r>
+            <a:r>
+              <a:rPr b="1" sz="2200">
+                <a:solidFill>
+                  <a:srgbClr val="000000"/>
+                </a:solidFill>
+                <a:latin typeface="Calibri"/>
+              </a:rPr>
+              <a:t>vulnerability assessment</a:t>
+            </a:r>
+            <a:r>
+              <a:rPr sz="2200">
+                <a:solidFill>
+                  <a:srgbClr val="000000"/>
+                </a:solidFill>
+                <a:latin typeface="Calibri"/>
+              </a:rPr>
+              <a:t> and </a:t>
+            </a:r>
+            <a:r>
+              <a:rPr b="1" sz="2200">
+                <a:solidFill>
+                  <a:srgbClr val="000000"/>
+                </a:solidFill>
+                <a:latin typeface="Calibri"/>
+              </a:rPr>
+              <a:t>compliance monitoring</a:t>
+            </a:r>
+            <a:r>
+              <a:rPr sz="2200">
+                <a:solidFill>
+                  <a:srgbClr val="000000"/>
+                </a:solidFill>
+                <a:latin typeface="Calibri"/>
+              </a:rPr>
+              <a:t/>
+            </a:r>
+          </a:p>
+        </p:txBody>
+      </p:sp>
+      <p:sp>
+        <p:nvSpPr>
+          <p:cNvPr id="4" name="TextBox 3">
             <a:extLst>
               <a:ext uri="{FF2B5EF4-FFF2-40B4-BE49-F238E27FC236}">
-                <a16:creationId xmlns:a16="http://schemas.microsoft.com/office/drawing/2014/main" id="{AF451D5C-51F7-F302-A410-1E28241E8DAB}"/>
-              </a:ext>
-            </a:extLst>
-          </p:cNvPr>
-          <p:cNvPicPr>
-            <a:picLocks noChangeAspect="1"/>
-          </p:cNvPicPr>
-          <p:nvPr/>
-        </p:nvPicPr>
-        <p:blipFill>
-          <a:blip r:embed="rId2"/>
-          <a:stretch>
-            <a:fillRect/>
-          </a:stretch>
-        </p:blipFill>
-        <p:spPr>
-          <a:xfrm>
-            <a:off x="1055020" y="4366210"/>
-            <a:ext cx="7058025" cy="2505075"/>
-          </a:xfrm>
-          <a:prstGeom prst="rect">
-            <a:avLst/>
-          </a:prstGeom>
-        </p:spPr>
-      </p:pic>
-      <p:sp>
-        <p:nvSpPr>
-          <p:cNvPr id="5" name="TextBox 4">
-            <a:extLst>
-              <a:ext uri="{FF2B5EF4-FFF2-40B4-BE49-F238E27FC236}">
-                <a16:creationId xmlns:a16="http://schemas.microsoft.com/office/drawing/2014/main" id="{43DD3C6E-9D14-4115-B0D4-2ECF2D26C31A}"/>
+                <a16:creationId xmlns:a16="http://schemas.microsoft.com/office/drawing/2014/main" id="{31D49A63-113D-4D89-FCDF-641BB513C668}"/>
               </a:ext>
             </a:extLst>
           </p:cNvPr>
@@ -6300,8 +7639,8 @@
         </p:nvSpPr>
         <p:spPr>
           <a:xfrm>
-            <a:off x="1058779" y="3741821"/>
-            <a:ext cx="4066673" cy="369332"/>
+            <a:off x="1637862" y="4114798"/>
+            <a:ext cx="4853165" cy="369332"/>
           </a:xfrm>
           <a:prstGeom prst="rect">
             <a:avLst/>
@@ -6309,27 +7648,24 @@
           <a:noFill/>
         </p:spPr>
         <p:txBody>
-          <a:bodyPr rot="0" spcFirstLastPara="0" vertOverflow="overflow" horzOverflow="overflow" vert="horz" wrap="square" lIns="91440" tIns="45720" rIns="91440" bIns="45720" numCol="1" spcCol="0" rtlCol="0" fromWordArt="0" anchor="t" anchorCtr="0" forceAA="0" compatLnSpc="1">
-            <a:prstTxWarp prst="textNoShape">
-              <a:avLst/>
-            </a:prstTxWarp>
+          <a:bodyPr wrap="square" rtlCol="0" anchor="t" anchorCtr="0">
             <a:spAutoFit/>
           </a:bodyPr>
           <a:lstStyle/>
           <a:p>
             <a:r>
-              <a:rPr lang="en-US" b="1"/>
-              <a:t>Example: Simple JSON Access</a:t>
-            </a:r>
-          </a:p>
-        </p:txBody>
-      </p:sp>
-      <p:sp>
-        <p:nvSpPr>
-          <p:cNvPr id="6" name="TextBox 5">
+              <a:rPr lang="en-IN" dirty="0"/>
+              <a:t/>
+            </a:r>
+          </a:p>
+        </p:txBody>
+      </p:sp>
+      <p:sp>
+        <p:nvSpPr>
+          <p:cNvPr id="5" name="TextBox 4">
             <a:extLst>
               <a:ext uri="{FF2B5EF4-FFF2-40B4-BE49-F238E27FC236}">
-                <a16:creationId xmlns:a16="http://schemas.microsoft.com/office/drawing/2014/main" id="{78924123-8F4E-5CAC-605D-0AC28F873100}"/>
+                <a16:creationId xmlns:a16="http://schemas.microsoft.com/office/drawing/2014/main" id="{5DDDEAD6-0A16-A764-2C88-3B42006212FC}"/>
               </a:ext>
             </a:extLst>
           </p:cNvPr>
@@ -6338,8 +7674,8 @@
         </p:nvSpPr>
         <p:spPr>
           <a:xfrm>
-            <a:off x="8915401" y="3741821"/>
-            <a:ext cx="4259178" cy="369332"/>
+            <a:off x="6491027" y="4114797"/>
+            <a:ext cx="6444000" cy="3348000"/>
           </a:xfrm>
           <a:prstGeom prst="rect">
             <a:avLst/>
@@ -6347,57 +7683,20 @@
           <a:noFill/>
         </p:spPr>
         <p:txBody>
-          <a:bodyPr rot="0" spcFirstLastPara="0" vertOverflow="overflow" horzOverflow="overflow" vert="horz" wrap="square" lIns="91440" tIns="45720" rIns="91440" bIns="45720" numCol="1" spcCol="0" rtlCol="0" fromWordArt="0" anchor="t" anchorCtr="0" forceAA="0" compatLnSpc="1">
-            <a:prstTxWarp prst="textNoShape">
-              <a:avLst/>
-            </a:prstTxWarp>
+          <a:bodyPr wrap="square" rtlCol="0" anchor="t" anchorCtr="0">
             <a:spAutoFit/>
           </a:bodyPr>
           <a:lstStyle/>
           <a:p>
             <a:r>
-              <a:rPr lang="en-US" b="1"/>
-              <a:t>Sample API Response:</a:t>
-            </a:r>
-          </a:p>
-        </p:txBody>
-      </p:sp>
-      <p:pic>
-        <p:nvPicPr>
-          <p:cNvPr id="7" name="Picture 6" descr="A screenshot of a computer code&#10;&#10;AI-generated content may be incorrect.">
-            <a:extLst>
-              <a:ext uri="{FF2B5EF4-FFF2-40B4-BE49-F238E27FC236}">
-                <a16:creationId xmlns:a16="http://schemas.microsoft.com/office/drawing/2014/main" id="{ADCB9175-62CD-E3F7-DA35-F677F6F31EDB}"/>
-              </a:ext>
-            </a:extLst>
-          </p:cNvPr>
-          <p:cNvPicPr>
-            <a:picLocks noChangeAspect="1"/>
-          </p:cNvPicPr>
-          <p:nvPr/>
-        </p:nvPicPr>
-        <p:blipFill>
-          <a:blip r:embed="rId3"/>
-          <a:stretch>
-            <a:fillRect/>
-          </a:stretch>
-        </p:blipFill>
-        <p:spPr>
-          <a:xfrm>
-            <a:off x="9050004" y="4367213"/>
-            <a:ext cx="2883067" cy="1829301"/>
-          </a:xfrm>
-          <a:prstGeom prst="rect">
-            <a:avLst/>
-          </a:prstGeom>
-        </p:spPr>
-      </p:pic>
+              <a:rPr lang="en-IN"/>
+              <a:t>status code: 404 -&gt; https://example.com/aws-security.png</a:t>
+            </a:r>
+            <a:endParaRPr lang="en-IN" dirty="0"/>
+          </a:p>
+        </p:txBody>
+      </p:sp>
     </p:spTree>
-    <p:extLst>
-      <p:ext uri="{BB962C8B-B14F-4D97-AF65-F5344CB8AC3E}">
-        <p14:creationId xmlns:p14="http://schemas.microsoft.com/office/powerpoint/2010/main" val="3951188525"/>
-      </p:ext>
-    </p:extLst>
   </p:cSld>
   <p:clrMapOvr>
     <a:masterClrMapping/>
@@ -6406,7 +7705,7 @@
 </file>
 
 <file path=ppt/slides/slide6.xml><?xml version="1.0" encoding="utf-8"?>
-<p:sld xmlns:a="http://schemas.openxmlformats.org/drawingml/2006/main" xmlns:r="http://schemas.openxmlformats.org/officeDocument/2006/relationships" xmlns:p="http://schemas.openxmlformats.org/presentationml/2006/main">
+<p:sld xmlns:a="http://schemas.openxmlformats.org/drawingml/2006/main" xmlns:p="http://schemas.openxmlformats.org/presentationml/2006/main" xmlns:r="http://schemas.openxmlformats.org/officeDocument/2006/relationships">
   <p:cSld>
     <p:spTree>
       <p:nvGrpSpPr>
@@ -6414,20 +7713,13 @@
         <p:cNvGrpSpPr/>
         <p:nvPr/>
       </p:nvGrpSpPr>
-      <p:grpSpPr>
-        <a:xfrm>
-          <a:off x="0" y="0"/>
-          <a:ext cx="0" cy="0"/>
-          <a:chOff x="0" y="0"/>
-          <a:chExt cx="0" cy="0"/>
-        </a:xfrm>
-      </p:grpSpPr>
+      <p:grpSpPr/>
       <p:sp>
         <p:nvSpPr>
           <p:cNvPr id="2" name="Title 1">
             <a:extLst>
               <a:ext uri="{FF2B5EF4-FFF2-40B4-BE49-F238E27FC236}">
-                <a16:creationId xmlns:a16="http://schemas.microsoft.com/office/drawing/2014/main" id="{59F0B984-7228-F3AB-61AD-6D86AC5C206B}"/>
+                <a16:creationId xmlns:a16="http://schemas.microsoft.com/office/drawing/2014/main" id="{8C546A1E-3282-3F02-B1AB-51E7A78F8696}"/>
               </a:ext>
             </a:extLst>
           </p:cNvPr>
@@ -6449,7 +7741,7 @@
                 <a:ea typeface="+mj-lt"/>
                 <a:cs typeface="+mj-lt"/>
               </a:rPr>
-              <a:t>Operators</a:t>
+              <a:t>Slide 6: AWS Pricing</a:t>
             </a:r>
             <a:endParaRPr lang="en-US" sz="3000" b="1" dirty="0">
               <a:latin typeface="Calibri"/>
@@ -6461,10 +7753,10 @@
       </p:sp>
       <p:sp>
         <p:nvSpPr>
-          <p:cNvPr id="3" name="TextBox 2">
+          <p:cNvPr id="7" name="TextBox 6">
             <a:extLst>
               <a:ext uri="{FF2B5EF4-FFF2-40B4-BE49-F238E27FC236}">
-                <a16:creationId xmlns:a16="http://schemas.microsoft.com/office/drawing/2014/main" id="{12AA078E-83F2-1FFF-B106-511668B808C4}"/>
+                <a16:creationId xmlns:a16="http://schemas.microsoft.com/office/drawing/2014/main" id="{D76FDF05-21BE-47CA-8E8E-B251B94A77D7}"/>
               </a:ext>
             </a:extLst>
           </p:cNvPr>
@@ -6473,8 +7765,8 @@
         </p:nvSpPr>
         <p:spPr>
           <a:xfrm>
-            <a:off x="2442410" y="1491916"/>
-            <a:ext cx="9757610" cy="547714"/>
+            <a:off x="2622428" y="1305911"/>
+            <a:ext cx="9396662" cy="547714"/>
           </a:xfrm>
           <a:prstGeom prst="rect">
             <a:avLst/>
@@ -6490,134 +7782,225 @@
           </a:bodyPr>
           <a:lstStyle/>
           <a:p>
-            <a:pPr marL="228600" indent="-228600">
+            <a:pPr marL="342900" indent="-342900">
               <a:lnSpc>
                 <a:spcPct val="150000"/>
               </a:lnSpc>
+              <a:buFont typeface="Arial" panose="020B0604020202020204" pitchFamily="34" charset="0"/>
+              <a:buChar char="•"/>
+            </a:pPr>
+            <a:r>
+              <a:rPr sz="2200">
+                <a:solidFill>
+                  <a:srgbClr val="000000"/>
+                </a:solidFill>
+                <a:latin typeface="Calibri"/>
+              </a:rPr>
+              <a:t/>
+            </a:r>
+            <a:r>
+              <a:rPr b="1" sz="2200">
+                <a:solidFill>
+                  <a:srgbClr val="000000"/>
+                </a:solidFill>
+                <a:latin typeface="Calibri"/>
+              </a:rPr>
+              <a:t>Pay-as-you-go</a:t>
+            </a:r>
+            <a:r>
+              <a:rPr sz="2200">
+                <a:solidFill>
+                  <a:srgbClr val="000000"/>
+                </a:solidFill>
+                <a:latin typeface="Calibri"/>
+              </a:rPr>
+              <a:t>: pay only for the </a:t>
+            </a:r>
+            <a:r>
+              <a:rPr b="1" sz="2200">
+                <a:solidFill>
+                  <a:srgbClr val="000000"/>
+                </a:solidFill>
+                <a:latin typeface="Calibri"/>
+              </a:rPr>
+              <a:t>resources</a:t>
+            </a:r>
+            <a:r>
+              <a:rPr sz="2200">
+                <a:solidFill>
+                  <a:srgbClr val="000000"/>
+                </a:solidFill>
+                <a:latin typeface="Calibri"/>
+              </a:rPr>
+              <a:t> you use</a:t>
+            </a:r>
+          </a:p>
+          <a:p>
+            <a:pPr algn="l">
               <a:spcAft>
-                <a:spcPts val="600"/>
+                <a:spcPts val="500"/>
               </a:spcAft>
-              <a:buFont typeface=""/>
-              <a:buChar char="•"/>
-              <a:defRPr sz="2200">
-                <a:latin typeface="Calibri"/>
-              </a:defRPr>
             </a:pPr>
             <a:r>
-              <a:t>Arithmetic operators (+, -, *, /, %)</a:t>
-            </a:r>
-          </a:p>
-          <a:p>
-            <a:pPr>
+              <a:rPr sz="2200">
+                <a:solidFill>
+                  <a:srgbClr val="000000"/>
+                </a:solidFill>
+                <a:latin typeface="Calibri"/>
+              </a:rPr>
+              <a:t/>
+            </a:r>
+            <a:r>
+              <a:rPr b="1" sz="2200">
+                <a:solidFill>
+                  <a:srgbClr val="000000"/>
+                </a:solidFill>
+                <a:latin typeface="Calibri"/>
+              </a:rPr>
+              <a:t>Reserved Instances</a:t>
+            </a:r>
+            <a:r>
+              <a:rPr sz="2200">
+                <a:solidFill>
+                  <a:srgbClr val="000000"/>
+                </a:solidFill>
+                <a:latin typeface="Calibri"/>
+              </a:rPr>
+              <a:t>: discounted </a:t>
+            </a:r>
+            <a:r>
+              <a:rPr b="1" sz="2200">
+                <a:solidFill>
+                  <a:srgbClr val="000000"/>
+                </a:solidFill>
+                <a:latin typeface="Calibri"/>
+              </a:rPr>
+              <a:t>pricing</a:t>
+            </a:r>
+            <a:r>
+              <a:rPr sz="2200">
+                <a:solidFill>
+                  <a:srgbClr val="000000"/>
+                </a:solidFill>
+                <a:latin typeface="Calibri"/>
+              </a:rPr>
+              <a:t> for committed </a:t>
+            </a:r>
+            <a:r>
+              <a:rPr b="1" sz="2200">
+                <a:solidFill>
+                  <a:srgbClr val="000000"/>
+                </a:solidFill>
+                <a:latin typeface="Calibri"/>
+              </a:rPr>
+              <a:t>usage</a:t>
+            </a:r>
+            <a:r>
+              <a:rPr sz="2200">
+                <a:solidFill>
+                  <a:srgbClr val="000000"/>
+                </a:solidFill>
+                <a:latin typeface="Calibri"/>
+              </a:rPr>
+              <a:t/>
+            </a:r>
+          </a:p>
+          <a:p>
+            <a:pPr algn="l">
               <a:spcAft>
-                <a:spcPts val="600"/>
+                <a:spcPts val="500"/>
               </a:spcAft>
-              <a:defRPr sz="2200">
-                <a:latin typeface="Calibri"/>
-              </a:defRPr>
             </a:pPr>
             <a:r>
-              <a:t>Comparison operators (==, !=, &gt;, &lt;, &gt;=, &lt;=)</a:t>
-            </a:r>
-          </a:p>
-          <a:p>
-            <a:pPr>
-              <a:spcAft>
-                <a:spcPts val="600"/>
-              </a:spcAft>
-              <a:defRPr sz="2200">
-                <a:latin typeface="Calibri"/>
-              </a:defRPr>
-            </a:pPr>
-            <a:r>
-              <a:t>Logical operators (and, or, not)</a:t>
-            </a:r>
-          </a:p>
-        </p:txBody>
-      </p:sp>
-      <p:graphicFrame>
-        <p:nvGraphicFramePr>
-          <p:cNvPr id="5" name="Table 4">
+              <a:rPr sz="2200">
+                <a:solidFill>
+                  <a:srgbClr val="000000"/>
+                </a:solidFill>
+                <a:latin typeface="Calibri"/>
+              </a:rPr>
+              <a:t/>
+            </a:r>
+            <a:r>
+              <a:rPr b="1" sz="2200">
+                <a:solidFill>
+                  <a:srgbClr val="000000"/>
+                </a:solidFill>
+                <a:latin typeface="Calibri"/>
+              </a:rPr>
+              <a:t>Free Tier</a:t>
+            </a:r>
+            <a:r>
+              <a:rPr sz="2200">
+                <a:solidFill>
+                  <a:srgbClr val="000000"/>
+                </a:solidFill>
+                <a:latin typeface="Calibri"/>
+              </a:rPr>
+              <a:t>: free </a:t>
+            </a:r>
+            <a:r>
+              <a:rPr b="1" sz="2200">
+                <a:solidFill>
+                  <a:srgbClr val="000000"/>
+                </a:solidFill>
+                <a:latin typeface="Calibri"/>
+              </a:rPr>
+              <a:t>access</a:t>
+            </a:r>
+            <a:r>
+              <a:rPr sz="2200">
+                <a:solidFill>
+                  <a:srgbClr val="000000"/>
+                </a:solidFill>
+                <a:latin typeface="Calibri"/>
+              </a:rPr>
+              <a:t> to certain </a:t>
+            </a:r>
+            <a:r>
+              <a:rPr b="1" sz="2200">
+                <a:solidFill>
+                  <a:srgbClr val="000000"/>
+                </a:solidFill>
+                <a:latin typeface="Calibri"/>
+              </a:rPr>
+              <a:t>services</a:t>
+            </a:r>
+            <a:r>
+              <a:rPr sz="2200">
+                <a:solidFill>
+                  <a:srgbClr val="000000"/>
+                </a:solidFill>
+                <a:latin typeface="Calibri"/>
+              </a:rPr>
+              <a:t> and </a:t>
+            </a:r>
+            <a:r>
+              <a:rPr b="1" sz="2200">
+                <a:solidFill>
+                  <a:srgbClr val="000000"/>
+                </a:solidFill>
+                <a:latin typeface="Calibri"/>
+              </a:rPr>
+              <a:t>resources</a:t>
+            </a:r>
+            <a:r>
+              <a:rPr sz="2200">
+                <a:solidFill>
+                  <a:srgbClr val="000000"/>
+                </a:solidFill>
+                <a:latin typeface="Calibri"/>
+              </a:rPr>
+              <a:t/>
+            </a:r>
+          </a:p>
+        </p:txBody>
+      </p:sp>
+      <p:sp>
+        <p:nvSpPr>
+          <p:cNvPr id="4" name="TextBox 3">
             <a:extLst>
               <a:ext uri="{FF2B5EF4-FFF2-40B4-BE49-F238E27FC236}">
-                <a16:creationId xmlns:a16="http://schemas.microsoft.com/office/drawing/2014/main" id="{877B7E26-E22A-A4E1-18B1-CDE175E6FD0F}"/>
-              </a:ext>
-            </a:extLst>
-          </p:cNvPr>
-          <p:cNvGraphicFramePr>
-            <a:graphicFrameLocks noGrp="1"/>
-          </p:cNvGraphicFramePr>
-          <p:nvPr>
-            <p:extLst>
-              <p:ext uri="{D42A27DB-BD31-4B8C-83A1-F6EECF244321}">
-                <p14:modId xmlns:p14="http://schemas.microsoft.com/office/powerpoint/2010/main" val="152986893"/>
-              </p:ext>
-            </p:extLst>
-          </p:nvPr>
-        </p:nvGraphicFramePr>
-        <p:xfrm>
-          <a:off x="0" y="3904488"/>
-          <a:ext cx="8590804" cy="880629"/>
-        </p:xfrm>
-        <a:graphic>
-          <a:graphicData uri="http://schemas.openxmlformats.org/drawingml/2006/table">
-            <a:tbl>
-              <a:tblPr bandRow="1">
-                <a:tableStyleId>{5C22544A-7EE6-4342-B048-85BDC9FD1C3A}</a:tableStyleId>
-              </a:tblPr>
-              <a:tblGrid>
-                <a:gridCol w="8590804">
-                  <a:extLst>
-                    <a:ext uri="{9D8B030D-6E8A-4147-A177-3AD203B41FA5}">
-                      <a16:colId xmlns:a16="http://schemas.microsoft.com/office/drawing/2014/main" val="70750250"/>
-                    </a:ext>
-                  </a:extLst>
-                </a:gridCol>
-              </a:tblGrid>
-              <a:tr h="880629">
-                <a:tc>
-                  <a:txBody>
-                    <a:bodyPr/>
-                    <a:lstStyle/>
-                    <a:p>
-                      <a:pPr>
-                        <a:buNone/>
-                      </a:pPr>
-                      <a:endParaRPr lang="en-US"/>
-                    </a:p>
-                  </a:txBody>
-                  <a:tcPr anchor="ctr">
-                    <a:lnL>
-                      <a:noFill/>
-                    </a:lnL>
-                    <a:lnR>
-                      <a:noFill/>
-                    </a:lnR>
-                    <a:lnT>
-                      <a:noFill/>
-                    </a:lnT>
-                    <a:lnB>
-                      <a:noFill/>
-                    </a:lnB>
-                    <a:noFill/>
-                  </a:tcPr>
-                </a:tc>
-                <a:extLst>
-                  <a:ext uri="{0D108BD9-81ED-4DB2-BD59-A6C34878D82A}">
-                    <a16:rowId xmlns:a16="http://schemas.microsoft.com/office/drawing/2014/main" val="3251731895"/>
-                  </a:ext>
-                </a:extLst>
-              </a:tr>
-            </a:tbl>
-          </a:graphicData>
-        </a:graphic>
-      </p:graphicFrame>
-      <p:sp>
-        <p:nvSpPr>
-          <p:cNvPr id="6" name="TextBox 5">
-            <a:extLst>
-              <a:ext uri="{FF2B5EF4-FFF2-40B4-BE49-F238E27FC236}">
-                <a16:creationId xmlns:a16="http://schemas.microsoft.com/office/drawing/2014/main" id="{5493BBEC-9F0C-F2A7-1D21-F87357F699F1}"/>
+                <a16:creationId xmlns:a16="http://schemas.microsoft.com/office/drawing/2014/main" id="{31D49A63-113D-4D89-FCDF-641BB513C668}"/>
               </a:ext>
             </a:extLst>
           </p:cNvPr>
@@ -6626,8 +8009,8 @@
         </p:nvSpPr>
         <p:spPr>
           <a:xfrm>
-            <a:off x="2021305" y="3537284"/>
-            <a:ext cx="4162926" cy="369332"/>
+            <a:off x="1637862" y="4114798"/>
+            <a:ext cx="4853165" cy="369332"/>
           </a:xfrm>
           <a:prstGeom prst="rect">
             <a:avLst/>
@@ -6635,57 +8018,55 @@
           <a:noFill/>
         </p:spPr>
         <p:txBody>
-          <a:bodyPr rot="0" spcFirstLastPara="0" vertOverflow="overflow" horzOverflow="overflow" vert="horz" wrap="square" lIns="91440" tIns="45720" rIns="91440" bIns="45720" numCol="1" spcCol="0" rtlCol="0" fromWordArt="0" anchor="t" anchorCtr="0" forceAA="0" compatLnSpc="1">
-            <a:prstTxWarp prst="textNoShape">
-              <a:avLst/>
-            </a:prstTxWarp>
+          <a:bodyPr wrap="square" rtlCol="0" anchor="t" anchorCtr="0">
             <a:spAutoFit/>
           </a:bodyPr>
           <a:lstStyle/>
           <a:p>
             <a:r>
-              <a:rPr lang="en-US" b="1"/>
-              <a:t>Common HTTP Status Codes:</a:t>
-            </a:r>
-          </a:p>
-        </p:txBody>
-      </p:sp>
-      <p:pic>
-        <p:nvPicPr>
-          <p:cNvPr id="7" name="Picture 6" descr="A screenshot of a computer error&#10;&#10;AI-generated content may be incorrect.">
+              <a:rPr lang="en-IN" dirty="0"/>
+              <a:t/>
+            </a:r>
+          </a:p>
+        </p:txBody>
+      </p:sp>
+      <p:sp>
+        <p:nvSpPr>
+          <p:cNvPr id="5" name="TextBox 4">
             <a:extLst>
               <a:ext uri="{FF2B5EF4-FFF2-40B4-BE49-F238E27FC236}">
-                <a16:creationId xmlns:a16="http://schemas.microsoft.com/office/drawing/2014/main" id="{ED95F62F-A9A2-C2AA-C7D0-1B14C67E3DA8}"/>
+                <a16:creationId xmlns:a16="http://schemas.microsoft.com/office/drawing/2014/main" id="{5DDDEAD6-0A16-A764-2C88-3B42006212FC}"/>
               </a:ext>
             </a:extLst>
           </p:cNvPr>
-          <p:cNvPicPr>
-            <a:picLocks noChangeAspect="1"/>
-          </p:cNvPicPr>
+          <p:cNvSpPr txBox="1"/>
           <p:nvPr/>
-        </p:nvPicPr>
-        <p:blipFill>
-          <a:blip r:embed="rId2"/>
-          <a:stretch>
-            <a:fillRect/>
-          </a:stretch>
-        </p:blipFill>
+        </p:nvSpPr>
         <p:spPr>
           <a:xfrm>
-            <a:off x="2610351" y="4112545"/>
-            <a:ext cx="8302792" cy="3000375"/>
+            <a:off x="6491027" y="4114797"/>
+            <a:ext cx="6444000" cy="3348000"/>
           </a:xfrm>
           <a:prstGeom prst="rect">
             <a:avLst/>
           </a:prstGeom>
+          <a:noFill/>
         </p:spPr>
-      </p:pic>
+        <p:txBody>
+          <a:bodyPr wrap="square" rtlCol="0" anchor="t" anchorCtr="0">
+            <a:spAutoFit/>
+          </a:bodyPr>
+          <a:lstStyle/>
+          <a:p>
+            <a:r>
+              <a:rPr lang="en-IN"/>
+              <a:t>status code: 404 -&gt; https://example.com/aws-pricing.png</a:t>
+            </a:r>
+            <a:endParaRPr lang="en-IN" dirty="0"/>
+          </a:p>
+        </p:txBody>
+      </p:sp>
     </p:spTree>
-    <p:extLst>
-      <p:ext uri="{BB962C8B-B14F-4D97-AF65-F5344CB8AC3E}">
-        <p14:creationId xmlns:p14="http://schemas.microsoft.com/office/powerpoint/2010/main" val="3268676450"/>
-      </p:ext>
-    </p:extLst>
   </p:cSld>
   <p:clrMapOvr>
     <a:masterClrMapping/>
@@ -6694,7 +8075,7 @@
 </file>
 
 <file path=ppt/slides/slide7.xml><?xml version="1.0" encoding="utf-8"?>
-<p:sld xmlns:a="http://schemas.openxmlformats.org/drawingml/2006/main" xmlns:r="http://schemas.openxmlformats.org/officeDocument/2006/relationships" xmlns:p="http://schemas.openxmlformats.org/presentationml/2006/main">
+<p:sld xmlns:a="http://schemas.openxmlformats.org/drawingml/2006/main" xmlns:p="http://schemas.openxmlformats.org/presentationml/2006/main" xmlns:r="http://schemas.openxmlformats.org/officeDocument/2006/relationships">
   <p:cSld>
     <p:spTree>
       <p:nvGrpSpPr>
@@ -6702,20 +8083,13 @@
         <p:cNvGrpSpPr/>
         <p:nvPr/>
       </p:nvGrpSpPr>
-      <p:grpSpPr>
-        <a:xfrm>
-          <a:off x="0" y="0"/>
-          <a:ext cx="0" cy="0"/>
-          <a:chOff x="0" y="0"/>
-          <a:chExt cx="0" cy="0"/>
-        </a:xfrm>
-      </p:grpSpPr>
+      <p:grpSpPr/>
       <p:sp>
         <p:nvSpPr>
           <p:cNvPr id="2" name="Title 1">
             <a:extLst>
               <a:ext uri="{FF2B5EF4-FFF2-40B4-BE49-F238E27FC236}">
-                <a16:creationId xmlns:a16="http://schemas.microsoft.com/office/drawing/2014/main" id="{9721F905-8E9D-274A-E526-E8E98D000C2D}"/>
+                <a16:creationId xmlns:a16="http://schemas.microsoft.com/office/drawing/2014/main" id="{8C546A1E-3282-3F02-B1AB-51E7A78F8696}"/>
               </a:ext>
             </a:extLst>
           </p:cNvPr>
@@ -6737,7 +8111,7 @@
                 <a:ea typeface="+mj-lt"/>
                 <a:cs typeface="+mj-lt"/>
               </a:rPr>
-              <a:t>Control Structures</a:t>
+              <a:t>Slide 7: AWS Support</a:t>
             </a:r>
             <a:endParaRPr lang="en-US" sz="3000" b="1" dirty="0">
               <a:latin typeface="Calibri"/>
@@ -6749,10 +8123,10 @@
       </p:sp>
       <p:sp>
         <p:nvSpPr>
-          <p:cNvPr id="3" name="TextBox 2">
+          <p:cNvPr id="7" name="TextBox 6">
             <a:extLst>
               <a:ext uri="{FF2B5EF4-FFF2-40B4-BE49-F238E27FC236}">
-                <a16:creationId xmlns:a16="http://schemas.microsoft.com/office/drawing/2014/main" id="{6136EE62-52D1-492E-8C71-1B091B3F080B}"/>
+                <a16:creationId xmlns:a16="http://schemas.microsoft.com/office/drawing/2014/main" id="{D76FDF05-21BE-47CA-8E8E-B251B94A77D7}"/>
               </a:ext>
             </a:extLst>
           </p:cNvPr>
@@ -6761,8 +8135,8 @@
         </p:nvSpPr>
         <p:spPr>
           <a:xfrm>
-            <a:off x="2725838" y="1467091"/>
-            <a:ext cx="9190298" cy="547714"/>
+            <a:off x="2622428" y="1305911"/>
+            <a:ext cx="9396662" cy="547714"/>
           </a:xfrm>
           <a:prstGeom prst="rect">
             <a:avLst/>
@@ -6782,53 +8156,287 @@
               <a:lnSpc>
                 <a:spcPct val="150000"/>
               </a:lnSpc>
-              <a:spcAft>
-                <a:spcPts val="600"/>
-              </a:spcAft>
               <a:buFont typeface="Arial" panose="020B0604020202020204" pitchFamily="34" charset="0"/>
               <a:buChar char="•"/>
-              <a:defRPr sz="2200">
-                <a:latin typeface="Calibri"/>
-              </a:defRPr>
             </a:pPr>
             <a:r>
-              <a:t>If-else statements</a:t>
-            </a:r>
-          </a:p>
-          <a:p>
-            <a:pPr>
+              <a:rPr sz="2200">
+                <a:solidFill>
+                  <a:srgbClr val="000000"/>
+                </a:solidFill>
+                <a:latin typeface="Calibri"/>
+              </a:rPr>
+              <a:t/>
+            </a:r>
+            <a:r>
+              <a:rPr b="1" sz="2200">
+                <a:solidFill>
+                  <a:srgbClr val="000000"/>
+                </a:solidFill>
+                <a:latin typeface="Calibri"/>
+              </a:rPr>
+              <a:t>Basic Support</a:t>
+            </a:r>
+            <a:r>
+              <a:rPr sz="2200">
+                <a:solidFill>
+                  <a:srgbClr val="000000"/>
+                </a:solidFill>
+                <a:latin typeface="Calibri"/>
+              </a:rPr>
+              <a:t>: free </a:t>
+            </a:r>
+            <a:r>
+              <a:rPr b="1" sz="2200">
+                <a:solidFill>
+                  <a:srgbClr val="000000"/>
+                </a:solidFill>
+                <a:latin typeface="Calibri"/>
+              </a:rPr>
+              <a:t>support</a:t>
+            </a:r>
+            <a:r>
+              <a:rPr sz="2200">
+                <a:solidFill>
+                  <a:srgbClr val="000000"/>
+                </a:solidFill>
+                <a:latin typeface="Calibri"/>
+              </a:rPr>
+              <a:t> with limited </a:t>
+            </a:r>
+            <a:r>
+              <a:rPr b="1" sz="2200">
+                <a:solidFill>
+                  <a:srgbClr val="000000"/>
+                </a:solidFill>
+                <a:latin typeface="Calibri"/>
+              </a:rPr>
+              <a:t>features</a:t>
+            </a:r>
+            <a:r>
+              <a:rPr sz="2200">
+                <a:solidFill>
+                  <a:srgbClr val="000000"/>
+                </a:solidFill>
+                <a:latin typeface="Calibri"/>
+              </a:rPr>
+              <a:t/>
+            </a:r>
+          </a:p>
+          <a:p>
+            <a:pPr algn="l">
               <a:spcAft>
-                <a:spcPts val="600"/>
+                <a:spcPts val="500"/>
               </a:spcAft>
-              <a:defRPr sz="2200">
-                <a:latin typeface="Calibri"/>
-              </a:defRPr>
             </a:pPr>
             <a:r>
-              <a:t>For loops</a:t>
-            </a:r>
-          </a:p>
-          <a:p>
-            <a:pPr>
+              <a:rPr sz="2200">
+                <a:solidFill>
+                  <a:srgbClr val="000000"/>
+                </a:solidFill>
+                <a:latin typeface="Calibri"/>
+              </a:rPr>
+              <a:t/>
+            </a:r>
+            <a:r>
+              <a:rPr b="1" sz="2200">
+                <a:solidFill>
+                  <a:srgbClr val="000000"/>
+                </a:solidFill>
+                <a:latin typeface="Calibri"/>
+              </a:rPr>
+              <a:t>Developer Support</a:t>
+            </a:r>
+            <a:r>
+              <a:rPr sz="2200">
+                <a:solidFill>
+                  <a:srgbClr val="000000"/>
+                </a:solidFill>
+                <a:latin typeface="Calibri"/>
+              </a:rPr>
+              <a:t>: paid </a:t>
+            </a:r>
+            <a:r>
+              <a:rPr b="1" sz="2200">
+                <a:solidFill>
+                  <a:srgbClr val="000000"/>
+                </a:solidFill>
+                <a:latin typeface="Calibri"/>
+              </a:rPr>
+              <a:t>support</a:t>
+            </a:r>
+            <a:r>
+              <a:rPr sz="2200">
+                <a:solidFill>
+                  <a:srgbClr val="000000"/>
+                </a:solidFill>
+                <a:latin typeface="Calibri"/>
+              </a:rPr>
+              <a:t> with additional </a:t>
+            </a:r>
+            <a:r>
+              <a:rPr b="1" sz="2200">
+                <a:solidFill>
+                  <a:srgbClr val="000000"/>
+                </a:solidFill>
+                <a:latin typeface="Calibri"/>
+              </a:rPr>
+              <a:t>features</a:t>
+            </a:r>
+            <a:r>
+              <a:rPr sz="2200">
+                <a:solidFill>
+                  <a:srgbClr val="000000"/>
+                </a:solidFill>
+                <a:latin typeface="Calibri"/>
+              </a:rPr>
+              <a:t/>
+            </a:r>
+          </a:p>
+          <a:p>
+            <a:pPr algn="l">
               <a:spcAft>
-                <a:spcPts val="600"/>
+                <a:spcPts val="500"/>
               </a:spcAft>
-              <a:defRPr sz="2200">
-                <a:latin typeface="Calibri"/>
-              </a:defRPr>
             </a:pPr>
             <a:r>
-              <a:t>While loops</a:t>
-            </a:r>
+              <a:rPr sz="2200">
+                <a:solidFill>
+                  <a:srgbClr val="000000"/>
+                </a:solidFill>
+                <a:latin typeface="Calibri"/>
+              </a:rPr>
+              <a:t/>
+            </a:r>
+            <a:r>
+              <a:rPr b="1" sz="2200">
+                <a:solidFill>
+                  <a:srgbClr val="000000"/>
+                </a:solidFill>
+                <a:latin typeface="Calibri"/>
+              </a:rPr>
+              <a:t>Business Support</a:t>
+            </a:r>
+            <a:r>
+              <a:rPr sz="2200">
+                <a:solidFill>
+                  <a:srgbClr val="000000"/>
+                </a:solidFill>
+                <a:latin typeface="Calibri"/>
+              </a:rPr>
+              <a:t>: premium </a:t>
+            </a:r>
+            <a:r>
+              <a:rPr b="1" sz="2200">
+                <a:solidFill>
+                  <a:srgbClr val="000000"/>
+                </a:solidFill>
+                <a:latin typeface="Calibri"/>
+              </a:rPr>
+              <a:t>support</a:t>
+            </a:r>
+            <a:r>
+              <a:rPr sz="2200">
+                <a:solidFill>
+                  <a:srgbClr val="000000"/>
+                </a:solidFill>
+                <a:latin typeface="Calibri"/>
+              </a:rPr>
+              <a:t> with advanced </a:t>
+            </a:r>
+            <a:r>
+              <a:rPr b="1" sz="2200">
+                <a:solidFill>
+                  <a:srgbClr val="000000"/>
+                </a:solidFill>
+                <a:latin typeface="Calibri"/>
+              </a:rPr>
+              <a:t>features</a:t>
+            </a:r>
+            <a:r>
+              <a:rPr sz="2200">
+                <a:solidFill>
+                  <a:srgbClr val="000000"/>
+                </a:solidFill>
+                <a:latin typeface="Calibri"/>
+              </a:rPr>
+              <a:t/>
+            </a:r>
+          </a:p>
+        </p:txBody>
+      </p:sp>
+      <p:sp>
+        <p:nvSpPr>
+          <p:cNvPr id="4" name="TextBox 3">
+            <a:extLst>
+              <a:ext uri="{FF2B5EF4-FFF2-40B4-BE49-F238E27FC236}">
+                <a16:creationId xmlns:a16="http://schemas.microsoft.com/office/drawing/2014/main" id="{31D49A63-113D-4D89-FCDF-641BB513C668}"/>
+              </a:ext>
+            </a:extLst>
+          </p:cNvPr>
+          <p:cNvSpPr txBox="1"/>
+          <p:nvPr/>
+        </p:nvSpPr>
+        <p:spPr>
+          <a:xfrm>
+            <a:off x="1637862" y="4114798"/>
+            <a:ext cx="4853165" cy="369332"/>
+          </a:xfrm>
+          <a:prstGeom prst="rect">
+            <a:avLst/>
+          </a:prstGeom>
+          <a:noFill/>
+        </p:spPr>
+        <p:txBody>
+          <a:bodyPr wrap="square" rtlCol="0" anchor="t" anchorCtr="0">
+            <a:spAutoFit/>
+          </a:bodyPr>
+          <a:lstStyle/>
+          <a:p>
+            <a:r>
+              <a:rPr lang="en-IN" dirty="0"/>
+              <a:t/>
+            </a:r>
+          </a:p>
+        </p:txBody>
+      </p:sp>
+      <p:sp>
+        <p:nvSpPr>
+          <p:cNvPr id="5" name="TextBox 4">
+            <a:extLst>
+              <a:ext uri="{FF2B5EF4-FFF2-40B4-BE49-F238E27FC236}">
+                <a16:creationId xmlns:a16="http://schemas.microsoft.com/office/drawing/2014/main" id="{5DDDEAD6-0A16-A764-2C88-3B42006212FC}"/>
+              </a:ext>
+            </a:extLst>
+          </p:cNvPr>
+          <p:cNvSpPr txBox="1"/>
+          <p:nvPr/>
+        </p:nvSpPr>
+        <p:spPr>
+          <a:xfrm>
+            <a:off x="6491027" y="4114797"/>
+            <a:ext cx="6444000" cy="3348000"/>
+          </a:xfrm>
+          <a:prstGeom prst="rect">
+            <a:avLst/>
+          </a:prstGeom>
+          <a:noFill/>
+        </p:spPr>
+        <p:txBody>
+          <a:bodyPr wrap="square" rtlCol="0" anchor="t" anchorCtr="0">
+            <a:spAutoFit/>
+          </a:bodyPr>
+          <a:lstStyle/>
+          <a:p>
+            <a:r>
+              <a:rPr lang="en-IN"/>
+              <a:t>status code: 404 -&gt; https://example.com/aws-support.png</a:t>
+            </a:r>
+            <a:endParaRPr lang="en-IN" dirty="0"/>
           </a:p>
         </p:txBody>
       </p:sp>
     </p:spTree>
-    <p:extLst>
-      <p:ext uri="{BB962C8B-B14F-4D97-AF65-F5344CB8AC3E}">
-        <p14:creationId xmlns:p14="http://schemas.microsoft.com/office/powerpoint/2010/main" val="1868477309"/>
-      </p:ext>
-    </p:extLst>
   </p:cSld>
   <p:clrMapOvr>
     <a:masterClrMapping/>
@@ -6837,7 +8445,7 @@
 </file>
 
 <file path=ppt/slides/slide8.xml><?xml version="1.0" encoding="utf-8"?>
-<p:sld xmlns:a="http://schemas.openxmlformats.org/drawingml/2006/main" xmlns:r="http://schemas.openxmlformats.org/officeDocument/2006/relationships" xmlns:p="http://schemas.openxmlformats.org/presentationml/2006/main">
+<p:sld xmlns:a="http://schemas.openxmlformats.org/drawingml/2006/main" xmlns:p="http://schemas.openxmlformats.org/presentationml/2006/main" xmlns:r="http://schemas.openxmlformats.org/officeDocument/2006/relationships">
   <p:cSld>
     <p:spTree>
       <p:nvGrpSpPr>
@@ -6845,20 +8453,13 @@
         <p:cNvGrpSpPr/>
         <p:nvPr/>
       </p:nvGrpSpPr>
-      <p:grpSpPr>
-        <a:xfrm>
-          <a:off x="0" y="0"/>
-          <a:ext cx="0" cy="0"/>
-          <a:chOff x="0" y="0"/>
-          <a:chExt cx="0" cy="0"/>
-        </a:xfrm>
-      </p:grpSpPr>
+      <p:grpSpPr/>
       <p:sp>
         <p:nvSpPr>
           <p:cNvPr id="2" name="Title 1">
             <a:extLst>
               <a:ext uri="{FF2B5EF4-FFF2-40B4-BE49-F238E27FC236}">
-                <a16:creationId xmlns:a16="http://schemas.microsoft.com/office/drawing/2014/main" id="{FA61537D-6018-DA80-2D18-2BD7C7D60E82}"/>
+                <a16:creationId xmlns:a16="http://schemas.microsoft.com/office/drawing/2014/main" id="{8C546A1E-3282-3F02-B1AB-51E7A78F8696}"/>
               </a:ext>
             </a:extLst>
           </p:cNvPr>
@@ -6880,7 +8481,7 @@
                 <a:ea typeface="+mj-lt"/>
                 <a:cs typeface="+mj-lt"/>
               </a:rPr>
-              <a:t>Functions</a:t>
+              <a:t>Slide 8: AWS Certification</a:t>
             </a:r>
             <a:endParaRPr lang="en-US" sz="3000" b="1" dirty="0">
               <a:latin typeface="Calibri"/>
@@ -6892,10 +8493,10 @@
       </p:sp>
       <p:sp>
         <p:nvSpPr>
-          <p:cNvPr id="3" name="TextBox 2">
+          <p:cNvPr id="7" name="TextBox 6">
             <a:extLst>
               <a:ext uri="{FF2B5EF4-FFF2-40B4-BE49-F238E27FC236}">
-                <a16:creationId xmlns:a16="http://schemas.microsoft.com/office/drawing/2014/main" id="{C80D93A9-C0BD-1FF1-8A30-E7A7ADBBA9B3}"/>
+                <a16:creationId xmlns:a16="http://schemas.microsoft.com/office/drawing/2014/main" id="{D76FDF05-21BE-47CA-8E8E-B251B94A77D7}"/>
               </a:ext>
             </a:extLst>
           </p:cNvPr>
@@ -6904,8 +8505,8 @@
         </p:nvSpPr>
         <p:spPr>
           <a:xfrm>
-            <a:off x="2262851" y="1362919"/>
-            <a:ext cx="10127846" cy="547714"/>
+            <a:off x="2622428" y="1305911"/>
+            <a:ext cx="9396662" cy="547714"/>
           </a:xfrm>
           <a:prstGeom prst="rect">
             <a:avLst/>
@@ -6925,83 +8526,287 @@
               <a:lnSpc>
                 <a:spcPct val="150000"/>
               </a:lnSpc>
-              <a:spcAft>
-                <a:spcPts val="600"/>
-              </a:spcAft>
               <a:buFont typeface="Arial" panose="020B0604020202020204" pitchFamily="34" charset="0"/>
               <a:buChar char="•"/>
-              <a:defRPr sz="2200">
-                <a:latin typeface="Calibri"/>
-              </a:defRPr>
             </a:pPr>
             <a:r>
-              <a:t>Reusable blocks of code</a:t>
-            </a:r>
-          </a:p>
-          <a:p>
-            <a:pPr>
+              <a:rPr sz="2200">
+                <a:solidFill>
+                  <a:srgbClr val="000000"/>
+                </a:solidFill>
+                <a:latin typeface="Calibri"/>
+              </a:rPr>
+              <a:t/>
+            </a:r>
+            <a:r>
+              <a:rPr b="1" sz="2200">
+                <a:solidFill>
+                  <a:srgbClr val="000000"/>
+                </a:solidFill>
+                <a:latin typeface="Calibri"/>
+              </a:rPr>
+              <a:t>Cloud Practitioner</a:t>
+            </a:r>
+            <a:r>
+              <a:rPr sz="2200">
+                <a:solidFill>
+                  <a:srgbClr val="000000"/>
+                </a:solidFill>
+                <a:latin typeface="Calibri"/>
+              </a:rPr>
+              <a:t>: foundational </a:t>
+            </a:r>
+            <a:r>
+              <a:rPr b="1" sz="2200">
+                <a:solidFill>
+                  <a:srgbClr val="000000"/>
+                </a:solidFill>
+                <a:latin typeface="Calibri"/>
+              </a:rPr>
+              <a:t>certification</a:t>
+            </a:r>
+            <a:r>
+              <a:rPr sz="2200">
+                <a:solidFill>
+                  <a:srgbClr val="000000"/>
+                </a:solidFill>
+                <a:latin typeface="Calibri"/>
+              </a:rPr>
+              <a:t> for </a:t>
+            </a:r>
+            <a:r>
+              <a:rPr b="1" sz="2200">
+                <a:solidFill>
+                  <a:srgbClr val="000000"/>
+                </a:solidFill>
+                <a:latin typeface="Calibri"/>
+              </a:rPr>
+              <a:t>cloud</a:t>
+            </a:r>
+            <a:r>
+              <a:rPr sz="2200">
+                <a:solidFill>
+                  <a:srgbClr val="000000"/>
+                </a:solidFill>
+                <a:latin typeface="Calibri"/>
+              </a:rPr>
+              <a:t> professionals</a:t>
+            </a:r>
+          </a:p>
+          <a:p>
+            <a:pPr algn="l">
               <a:spcAft>
-                <a:spcPts val="600"/>
+                <a:spcPts val="500"/>
               </a:spcAft>
-              <a:defRPr sz="2200">
-                <a:latin typeface="Calibri"/>
-              </a:defRPr>
             </a:pPr>
             <a:r>
-              <a:t>Take arguments and return values</a:t>
-            </a:r>
-          </a:p>
-          <a:p>
-            <a:pPr>
+              <a:rPr sz="2200">
+                <a:solidFill>
+                  <a:srgbClr val="000000"/>
+                </a:solidFill>
+                <a:latin typeface="Calibri"/>
+              </a:rPr>
+              <a:t/>
+            </a:r>
+            <a:r>
+              <a:rPr b="1" sz="2200">
+                <a:solidFill>
+                  <a:srgbClr val="000000"/>
+                </a:solidFill>
+                <a:latin typeface="Calibri"/>
+              </a:rPr>
+              <a:t>Associate</a:t>
+            </a:r>
+            <a:r>
+              <a:rPr sz="2200">
+                <a:solidFill>
+                  <a:srgbClr val="000000"/>
+                </a:solidFill>
+                <a:latin typeface="Calibri"/>
+              </a:rPr>
+              <a:t>: intermediate </a:t>
+            </a:r>
+            <a:r>
+              <a:rPr b="1" sz="2200">
+                <a:solidFill>
+                  <a:srgbClr val="000000"/>
+                </a:solidFill>
+                <a:latin typeface="Calibri"/>
+              </a:rPr>
+              <a:t>certification</a:t>
+            </a:r>
+            <a:r>
+              <a:rPr sz="2200">
+                <a:solidFill>
+                  <a:srgbClr val="000000"/>
+                </a:solidFill>
+                <a:latin typeface="Calibri"/>
+              </a:rPr>
+              <a:t> for </a:t>
+            </a:r>
+            <a:r>
+              <a:rPr b="1" sz="2200">
+                <a:solidFill>
+                  <a:srgbClr val="000000"/>
+                </a:solidFill>
+                <a:latin typeface="Calibri"/>
+              </a:rPr>
+              <a:t>technical</a:t>
+            </a:r>
+            <a:r>
+              <a:rPr sz="2200">
+                <a:solidFill>
+                  <a:srgbClr val="000000"/>
+                </a:solidFill>
+                <a:latin typeface="Calibri"/>
+              </a:rPr>
+              <a:t> roles</a:t>
+            </a:r>
+          </a:p>
+          <a:p>
+            <a:pPr algn="l">
               <a:spcAft>
-                <a:spcPts val="600"/>
+                <a:spcPts val="500"/>
               </a:spcAft>
-              <a:defRPr sz="2200">
-                <a:latin typeface="Calibri"/>
-              </a:defRPr>
             </a:pPr>
             <a:r>
-              <a:t>Used to organize and simplify code</a:t>
-            </a:r>
-          </a:p>
-        </p:txBody>
-      </p:sp>
-      <p:pic>
-        <p:nvPicPr>
-          <p:cNvPr id="4" name="Picture 3" descr="pymupdf · GitHub Topics · GitHub">
+              <a:rPr sz="2200">
+                <a:solidFill>
+                  <a:srgbClr val="000000"/>
+                </a:solidFill>
+                <a:latin typeface="Calibri"/>
+              </a:rPr>
+              <a:t/>
+            </a:r>
+            <a:r>
+              <a:rPr b="1" sz="2200">
+                <a:solidFill>
+                  <a:srgbClr val="000000"/>
+                </a:solidFill>
+                <a:latin typeface="Calibri"/>
+              </a:rPr>
+              <a:t>Professional</a:t>
+            </a:r>
+            <a:r>
+              <a:rPr sz="2200">
+                <a:solidFill>
+                  <a:srgbClr val="000000"/>
+                </a:solidFill>
+                <a:latin typeface="Calibri"/>
+              </a:rPr>
+              <a:t>: advanced </a:t>
+            </a:r>
+            <a:r>
+              <a:rPr b="1" sz="2200">
+                <a:solidFill>
+                  <a:srgbClr val="000000"/>
+                </a:solidFill>
+                <a:latin typeface="Calibri"/>
+              </a:rPr>
+              <a:t>certification</a:t>
+            </a:r>
+            <a:r>
+              <a:rPr sz="2200">
+                <a:solidFill>
+                  <a:srgbClr val="000000"/>
+                </a:solidFill>
+                <a:latin typeface="Calibri"/>
+              </a:rPr>
+              <a:t> for </a:t>
+            </a:r>
+            <a:r>
+              <a:rPr b="1" sz="2200">
+                <a:solidFill>
+                  <a:srgbClr val="000000"/>
+                </a:solidFill>
+                <a:latin typeface="Calibri"/>
+              </a:rPr>
+              <a:t>expert</a:t>
+            </a:r>
+            <a:r>
+              <a:rPr sz="2200">
+                <a:solidFill>
+                  <a:srgbClr val="000000"/>
+                </a:solidFill>
+                <a:latin typeface="Calibri"/>
+              </a:rPr>
+              <a:t> roles</a:t>
+            </a:r>
+          </a:p>
+        </p:txBody>
+      </p:sp>
+      <p:sp>
+        <p:nvSpPr>
+          <p:cNvPr id="4" name="TextBox 3">
             <a:extLst>
               <a:ext uri="{FF2B5EF4-FFF2-40B4-BE49-F238E27FC236}">
-                <a16:creationId xmlns:a16="http://schemas.microsoft.com/office/drawing/2014/main" id="{3FA5A263-A383-C10A-E2BA-F23BDF4FFD6E}"/>
+                <a16:creationId xmlns:a16="http://schemas.microsoft.com/office/drawing/2014/main" id="{31D49A63-113D-4D89-FCDF-641BB513C668}"/>
               </a:ext>
             </a:extLst>
           </p:cNvPr>
-          <p:cNvPicPr>
-            <a:picLocks noChangeAspect="1"/>
-          </p:cNvPicPr>
+          <p:cNvSpPr txBox="1"/>
           <p:nvPr/>
-        </p:nvPicPr>
-        <p:blipFill>
-          <a:blip r:embed="rId2"/>
-          <a:stretch>
-            <a:fillRect/>
-          </a:stretch>
-        </p:blipFill>
+        </p:nvSpPr>
         <p:spPr>
           <a:xfrm>
-            <a:off x="4415743" y="4273951"/>
-            <a:ext cx="5416951" cy="2725837"/>
+            <a:off x="1637862" y="4114798"/>
+            <a:ext cx="4853165" cy="369332"/>
           </a:xfrm>
           <a:prstGeom prst="rect">
             <a:avLst/>
           </a:prstGeom>
+          <a:noFill/>
         </p:spPr>
-      </p:pic>
+        <p:txBody>
+          <a:bodyPr wrap="square" rtlCol="0" anchor="t" anchorCtr="0">
+            <a:spAutoFit/>
+          </a:bodyPr>
+          <a:lstStyle/>
+          <a:p>
+            <a:r>
+              <a:rPr lang="en-IN" dirty="0"/>
+              <a:t/>
+            </a:r>
+          </a:p>
+        </p:txBody>
+      </p:sp>
+      <p:sp>
+        <p:nvSpPr>
+          <p:cNvPr id="5" name="TextBox 4">
+            <a:extLst>
+              <a:ext uri="{FF2B5EF4-FFF2-40B4-BE49-F238E27FC236}">
+                <a16:creationId xmlns:a16="http://schemas.microsoft.com/office/drawing/2014/main" id="{5DDDEAD6-0A16-A764-2C88-3B42006212FC}"/>
+              </a:ext>
+            </a:extLst>
+          </p:cNvPr>
+          <p:cNvSpPr txBox="1"/>
+          <p:nvPr/>
+        </p:nvSpPr>
+        <p:spPr>
+          <a:xfrm>
+            <a:off x="6491027" y="4114797"/>
+            <a:ext cx="6444000" cy="3348000"/>
+          </a:xfrm>
+          <a:prstGeom prst="rect">
+            <a:avLst/>
+          </a:prstGeom>
+          <a:noFill/>
+        </p:spPr>
+        <p:txBody>
+          <a:bodyPr wrap="square" rtlCol="0" anchor="t" anchorCtr="0">
+            <a:spAutoFit/>
+          </a:bodyPr>
+          <a:lstStyle/>
+          <a:p>
+            <a:r>
+              <a:rPr lang="en-IN"/>
+              <a:t>status code: 404 -&gt; https://example.com/aws-certification.png</a:t>
+            </a:r>
+            <a:endParaRPr lang="en-IN" dirty="0"/>
+          </a:p>
+        </p:txBody>
+      </p:sp>
     </p:spTree>
-    <p:extLst>
-      <p:ext uri="{BB962C8B-B14F-4D97-AF65-F5344CB8AC3E}">
-        <p14:creationId xmlns:p14="http://schemas.microsoft.com/office/powerpoint/2010/main" val="3487897621"/>
-      </p:ext>
-    </p:extLst>
   </p:cSld>
   <p:clrMapOvr>
     <a:masterClrMapping/>
@@ -7010,7 +8815,7 @@
 </file>
 
 <file path=ppt/slides/slide9.xml><?xml version="1.0" encoding="utf-8"?>
-<p:sld xmlns:a="http://schemas.openxmlformats.org/drawingml/2006/main" xmlns:r="http://schemas.openxmlformats.org/officeDocument/2006/relationships" xmlns:p="http://schemas.openxmlformats.org/presentationml/2006/main">
+<p:sld xmlns:a="http://schemas.openxmlformats.org/drawingml/2006/main" xmlns:p="http://schemas.openxmlformats.org/presentationml/2006/main" xmlns:r="http://schemas.openxmlformats.org/officeDocument/2006/relationships">
   <p:cSld>
     <p:spTree>
       <p:nvGrpSpPr>
@@ -7018,20 +8823,13 @@
         <p:cNvGrpSpPr/>
         <p:nvPr/>
       </p:nvGrpSpPr>
-      <p:grpSpPr>
-        <a:xfrm>
-          <a:off x="0" y="0"/>
-          <a:ext cx="0" cy="0"/>
-          <a:chOff x="0" y="0"/>
-          <a:chExt cx="0" cy="0"/>
-        </a:xfrm>
-      </p:grpSpPr>
+      <p:grpSpPr/>
       <p:sp>
         <p:nvSpPr>
           <p:cNvPr id="2" name="Title 1">
             <a:extLst>
               <a:ext uri="{FF2B5EF4-FFF2-40B4-BE49-F238E27FC236}">
-                <a16:creationId xmlns:a16="http://schemas.microsoft.com/office/drawing/2014/main" id="{3652F2AC-2A48-EF0A-4C2C-92487DDA4950}"/>
+                <a16:creationId xmlns:a16="http://schemas.microsoft.com/office/drawing/2014/main" id="{8C546A1E-3282-3F02-B1AB-51E7A78F8696}"/>
               </a:ext>
             </a:extLst>
           </p:cNvPr>
@@ -7053,7 +8851,7 @@
                 <a:ea typeface="+mj-lt"/>
                 <a:cs typeface="+mj-lt"/>
               </a:rPr>
-              <a:t>Lists</a:t>
+              <a:t>Slide 9: AWS Architecture</a:t>
             </a:r>
             <a:endParaRPr lang="en-US" sz="3000" b="1" dirty="0">
               <a:latin typeface="Calibri"/>
@@ -7068,7 +8866,7 @@
           <p:cNvPr id="7" name="TextBox 6">
             <a:extLst>
               <a:ext uri="{FF2B5EF4-FFF2-40B4-BE49-F238E27FC236}">
-                <a16:creationId xmlns:a16="http://schemas.microsoft.com/office/drawing/2014/main" id="{B5BF6B0D-B37B-DF87-1B40-241108794F69}"/>
+                <a16:creationId xmlns:a16="http://schemas.microsoft.com/office/drawing/2014/main" id="{D76FDF05-21BE-47CA-8E8E-B251B94A77D7}"/>
               </a:ext>
             </a:extLst>
           </p:cNvPr>
@@ -7077,8 +8875,8 @@
         </p:nvSpPr>
         <p:spPr>
           <a:xfrm>
-            <a:off x="2934183" y="1455517"/>
-            <a:ext cx="8403219" cy="547714"/>
+            <a:off x="2622428" y="1305911"/>
+            <a:ext cx="9396662" cy="547714"/>
           </a:xfrm>
           <a:prstGeom prst="rect">
             <a:avLst/>
@@ -7098,53 +8896,305 @@
               <a:lnSpc>
                 <a:spcPct val="150000"/>
               </a:lnSpc>
-              <a:spcAft>
-                <a:spcPts val="600"/>
-              </a:spcAft>
               <a:buFont typeface="Arial" panose="020B0604020202020204" pitchFamily="34" charset="0"/>
               <a:buChar char="•"/>
-              <a:defRPr sz="2200">
-                <a:latin typeface="Calibri"/>
-              </a:defRPr>
             </a:pPr>
             <a:r>
-              <a:t>Ordered collections of items</a:t>
-            </a:r>
-          </a:p>
-          <a:p>
-            <a:pPr>
+              <a:rPr sz="2200">
+                <a:solidFill>
+                  <a:srgbClr val="000000"/>
+                </a:solidFill>
+                <a:latin typeface="Calibri"/>
+              </a:rPr>
+              <a:t/>
+            </a:r>
+            <a:r>
+              <a:rPr b="1" sz="2200">
+                <a:solidFill>
+                  <a:srgbClr val="000000"/>
+                </a:solidFill>
+                <a:latin typeface="Calibri"/>
+              </a:rPr>
+              <a:t>Regions</a:t>
+            </a:r>
+            <a:r>
+              <a:rPr sz="2200">
+                <a:solidFill>
+                  <a:srgbClr val="000000"/>
+                </a:solidFill>
+                <a:latin typeface="Calibri"/>
+              </a:rPr>
+              <a:t>: geographical </a:t>
+            </a:r>
+            <a:r>
+              <a:rPr b="1" sz="2200">
+                <a:solidFill>
+                  <a:srgbClr val="000000"/>
+                </a:solidFill>
+                <a:latin typeface="Calibri"/>
+              </a:rPr>
+              <a:t>locations</a:t>
+            </a:r>
+            <a:r>
+              <a:rPr sz="2200">
+                <a:solidFill>
+                  <a:srgbClr val="000000"/>
+                </a:solidFill>
+                <a:latin typeface="Calibri"/>
+              </a:rPr>
+              <a:t> for </a:t>
+            </a:r>
+            <a:r>
+              <a:rPr b="1" sz="2200">
+                <a:solidFill>
+                  <a:srgbClr val="000000"/>
+                </a:solidFill>
+                <a:latin typeface="Calibri"/>
+              </a:rPr>
+              <a:t>data centers</a:t>
+            </a:r>
+            <a:r>
+              <a:rPr sz="2200">
+                <a:solidFill>
+                  <a:srgbClr val="000000"/>
+                </a:solidFill>
+                <a:latin typeface="Calibri"/>
+              </a:rPr>
+              <a:t/>
+            </a:r>
+          </a:p>
+          <a:p>
+            <a:pPr algn="l">
               <a:spcAft>
-                <a:spcPts val="600"/>
+                <a:spcPts val="500"/>
               </a:spcAft>
-              <a:defRPr sz="2200">
-                <a:latin typeface="Calibri"/>
-              </a:defRPr>
             </a:pPr>
             <a:r>
-              <a:t>Defined using square brackets []</a:t>
-            </a:r>
-          </a:p>
-          <a:p>
-            <a:pPr>
+              <a:rPr sz="2200">
+                <a:solidFill>
+                  <a:srgbClr val="000000"/>
+                </a:solidFill>
+                <a:latin typeface="Calibri"/>
+              </a:rPr>
+              <a:t/>
+            </a:r>
+            <a:r>
+              <a:rPr b="1" sz="2200">
+                <a:solidFill>
+                  <a:srgbClr val="000000"/>
+                </a:solidFill>
+                <a:latin typeface="Calibri"/>
+              </a:rPr>
+              <a:t>Availability Zones</a:t>
+            </a:r>
+            <a:r>
+              <a:rPr sz="2200">
+                <a:solidFill>
+                  <a:srgbClr val="000000"/>
+                </a:solidFill>
+                <a:latin typeface="Calibri"/>
+              </a:rPr>
+              <a:t>: isolated </a:t>
+            </a:r>
+            <a:r>
+              <a:rPr b="1" sz="2200">
+                <a:solidFill>
+                  <a:srgbClr val="000000"/>
+                </a:solidFill>
+                <a:latin typeface="Calibri"/>
+              </a:rPr>
+              <a:t>locations</a:t>
+            </a:r>
+            <a:r>
+              <a:rPr sz="2200">
+                <a:solidFill>
+                  <a:srgbClr val="000000"/>
+                </a:solidFill>
+                <a:latin typeface="Calibri"/>
+              </a:rPr>
+              <a:t> within </a:t>
+            </a:r>
+            <a:r>
+              <a:rPr b="1" sz="2200">
+                <a:solidFill>
+                  <a:srgbClr val="000000"/>
+                </a:solidFill>
+                <a:latin typeface="Calibri"/>
+              </a:rPr>
+              <a:t>regions</a:t>
+            </a:r>
+            <a:r>
+              <a:rPr sz="2200">
+                <a:solidFill>
+                  <a:srgbClr val="000000"/>
+                </a:solidFill>
+                <a:latin typeface="Calibri"/>
+              </a:rPr>
+              <a:t> for </a:t>
+            </a:r>
+            <a:r>
+              <a:rPr b="1" sz="2200">
+                <a:solidFill>
+                  <a:srgbClr val="000000"/>
+                </a:solidFill>
+                <a:latin typeface="Calibri"/>
+              </a:rPr>
+              <a:t>high availability</a:t>
+            </a:r>
+            <a:r>
+              <a:rPr sz="2200">
+                <a:solidFill>
+                  <a:srgbClr val="000000"/>
+                </a:solidFill>
+                <a:latin typeface="Calibri"/>
+              </a:rPr>
+              <a:t/>
+            </a:r>
+          </a:p>
+          <a:p>
+            <a:pPr algn="l">
               <a:spcAft>
-                <a:spcPts val="600"/>
+                <a:spcPts val="500"/>
               </a:spcAft>
-              <a:defRPr sz="2200">
-                <a:latin typeface="Calibri"/>
-              </a:defRPr>
             </a:pPr>
             <a:r>
-              <a:t>Support indexing and slicing</a:t>
-            </a:r>
+              <a:rPr sz="2200">
+                <a:solidFill>
+                  <a:srgbClr val="000000"/>
+                </a:solidFill>
+                <a:latin typeface="Calibri"/>
+              </a:rPr>
+              <a:t/>
+            </a:r>
+            <a:r>
+              <a:rPr b="1" sz="2200">
+                <a:solidFill>
+                  <a:srgbClr val="000000"/>
+                </a:solidFill>
+                <a:latin typeface="Calibri"/>
+              </a:rPr>
+              <a:t>Edge Locations</a:t>
+            </a:r>
+            <a:r>
+              <a:rPr sz="2200">
+                <a:solidFill>
+                  <a:srgbClr val="000000"/>
+                </a:solidFill>
+                <a:latin typeface="Calibri"/>
+              </a:rPr>
+              <a:t>: </a:t>
+            </a:r>
+            <a:r>
+              <a:rPr b="1" sz="2200">
+                <a:solidFill>
+                  <a:srgbClr val="000000"/>
+                </a:solidFill>
+                <a:latin typeface="Calibri"/>
+              </a:rPr>
+              <a:t>caching</a:t>
+            </a:r>
+            <a:r>
+              <a:rPr sz="2200">
+                <a:solidFill>
+                  <a:srgbClr val="000000"/>
+                </a:solidFill>
+                <a:latin typeface="Calibri"/>
+              </a:rPr>
+              <a:t> and </a:t>
+            </a:r>
+            <a:r>
+              <a:rPr b="1" sz="2200">
+                <a:solidFill>
+                  <a:srgbClr val="000000"/>
+                </a:solidFill>
+                <a:latin typeface="Calibri"/>
+              </a:rPr>
+              <a:t>content delivery</a:t>
+            </a:r>
+            <a:r>
+              <a:rPr sz="2200">
+                <a:solidFill>
+                  <a:srgbClr val="000000"/>
+                </a:solidFill>
+                <a:latin typeface="Calibri"/>
+              </a:rPr>
+              <a:t> nodes</a:t>
+            </a:r>
+          </a:p>
+        </p:txBody>
+      </p:sp>
+      <p:sp>
+        <p:nvSpPr>
+          <p:cNvPr id="4" name="TextBox 3">
+            <a:extLst>
+              <a:ext uri="{FF2B5EF4-FFF2-40B4-BE49-F238E27FC236}">
+                <a16:creationId xmlns:a16="http://schemas.microsoft.com/office/drawing/2014/main" id="{31D49A63-113D-4D89-FCDF-641BB513C668}"/>
+              </a:ext>
+            </a:extLst>
+          </p:cNvPr>
+          <p:cNvSpPr txBox="1"/>
+          <p:nvPr/>
+        </p:nvSpPr>
+        <p:spPr>
+          <a:xfrm>
+            <a:off x="1637862" y="4114798"/>
+            <a:ext cx="4853165" cy="369332"/>
+          </a:xfrm>
+          <a:prstGeom prst="rect">
+            <a:avLst/>
+          </a:prstGeom>
+          <a:noFill/>
+        </p:spPr>
+        <p:txBody>
+          <a:bodyPr wrap="square" rtlCol="0" anchor="t" anchorCtr="0">
+            <a:spAutoFit/>
+          </a:bodyPr>
+          <a:lstStyle/>
+          <a:p>
+            <a:r>
+              <a:rPr lang="en-IN" dirty="0"/>
+              <a:t/>
+            </a:r>
+          </a:p>
+        </p:txBody>
+      </p:sp>
+      <p:sp>
+        <p:nvSpPr>
+          <p:cNvPr id="5" name="TextBox 4">
+            <a:extLst>
+              <a:ext uri="{FF2B5EF4-FFF2-40B4-BE49-F238E27FC236}">
+                <a16:creationId xmlns:a16="http://schemas.microsoft.com/office/drawing/2014/main" id="{5DDDEAD6-0A16-A764-2C88-3B42006212FC}"/>
+              </a:ext>
+            </a:extLst>
+          </p:cNvPr>
+          <p:cNvSpPr txBox="1"/>
+          <p:nvPr/>
+        </p:nvSpPr>
+        <p:spPr>
+          <a:xfrm>
+            <a:off x="6491027" y="4114797"/>
+            <a:ext cx="6444000" cy="3348000"/>
+          </a:xfrm>
+          <a:prstGeom prst="rect">
+            <a:avLst/>
+          </a:prstGeom>
+          <a:noFill/>
+        </p:spPr>
+        <p:txBody>
+          <a:bodyPr wrap="square" rtlCol="0" anchor="t" anchorCtr="0">
+            <a:spAutoFit/>
+          </a:bodyPr>
+          <a:lstStyle/>
+          <a:p>
+            <a:r>
+              <a:rPr lang="en-IN"/>
+              <a:t>status code: 404 -&gt; https://example.com/aws-architecture.png</a:t>
+            </a:r>
+            <a:endParaRPr lang="en-IN" dirty="0"/>
           </a:p>
         </p:txBody>
       </p:sp>
     </p:spTree>
-    <p:extLst>
-      <p:ext uri="{BB962C8B-B14F-4D97-AF65-F5344CB8AC3E}">
-        <p14:creationId xmlns:p14="http://schemas.microsoft.com/office/powerpoint/2010/main" val="3339277221"/>
-      </p:ext>
-    </p:extLst>
   </p:cSld>
   <p:clrMapOvr>
     <a:masterClrMapping/>

</xml_diff>